<commit_message>
Update presentation (add graphics)
</commit_message>
<xml_diff>
--- a/Présentation/Présentation intermédiaire.pptx
+++ b/Présentation/Présentation intermédiaire.pptx
@@ -8011,10 +8011,6 @@
               <a:rPr lang="fr-CH" dirty="0" smtClean="0"/>
               <a:t>Partie réseau</a:t>
             </a:r>
-            <a:r>
-              <a:rPr lang="fr-CH" dirty="0" smtClean="0"/>
-              <a:t/>
-            </a:r>
             <a:br>
               <a:rPr lang="fr-CH" dirty="0" smtClean="0"/>
             </a:br>
@@ -8247,14 +8243,38 @@
           <a:p>
             <a:r>
               <a:rPr lang="fr-CH" sz="2400" dirty="0" smtClean="0"/>
-              <a:t>Avancement du projet</a:t>
-            </a:r>
-          </a:p>
-          <a:p>
+              <a:t>Avancement du </a:t>
+            </a:r>
             <a:r>
               <a:rPr lang="fr-CH" sz="2400" dirty="0" smtClean="0"/>
-              <a:t>Aperçu de l’état d’avancement</a:t>
-            </a:r>
+              <a:t>projet</a:t>
+            </a:r>
+          </a:p>
+          <a:p>
+            <a:pPr lvl="1"/>
+            <a:r>
+              <a:rPr lang="fr-CH" sz="2200" dirty="0" smtClean="0"/>
+              <a:t>Par rapport à la planification</a:t>
+            </a:r>
+            <a:endParaRPr lang="fr-CH" sz="2200" dirty="0" smtClean="0"/>
+          </a:p>
+          <a:p>
+            <a:r>
+              <a:rPr lang="fr-CH" sz="2400" dirty="0" smtClean="0"/>
+              <a:t>Aperçu de l’état </a:t>
+            </a:r>
+            <a:r>
+              <a:rPr lang="fr-CH" sz="2400" dirty="0" smtClean="0"/>
+              <a:t>d’avancement</a:t>
+            </a:r>
+          </a:p>
+          <a:p>
+            <a:pPr lvl="1"/>
+            <a:r>
+              <a:rPr lang="fr-CH" sz="2200" dirty="0" smtClean="0"/>
+              <a:t>Implémentation</a:t>
+            </a:r>
+            <a:endParaRPr lang="fr-CH" sz="2200" dirty="0" smtClean="0"/>
           </a:p>
           <a:p>
             <a:endParaRPr lang="fr-CH" sz="2400" dirty="0"/>
@@ -8285,6 +8305,36 @@
           </a:p>
         </p:txBody>
       </p:sp>
+      <p:pic>
+        <p:nvPicPr>
+          <p:cNvPr id="6" name="Image 5"/>
+          <p:cNvPicPr>
+            <a:picLocks noChangeAspect="1"/>
+          </p:cNvPicPr>
+          <p:nvPr/>
+        </p:nvPicPr>
+        <p:blipFill>
+          <a:blip r:embed="rId2">
+            <a:extLst>
+              <a:ext uri="{28A0092B-C50C-407E-A947-70E740481C1C}">
+                <a14:useLocalDpi xmlns:a14="http://schemas.microsoft.com/office/drawing/2010/main" val="0"/>
+              </a:ext>
+            </a:extLst>
+          </a:blip>
+          <a:stretch>
+            <a:fillRect/>
+          </a:stretch>
+        </p:blipFill>
+        <p:spPr>
+          <a:xfrm>
+            <a:off x="6424926" y="4001349"/>
+            <a:ext cx="2230328" cy="2101501"/>
+          </a:xfrm>
+          <a:prstGeom prst="rect">
+            <a:avLst/>
+          </a:prstGeom>
+        </p:spPr>
+      </p:pic>
     </p:spTree>
     <p:extLst>
       <p:ext uri="{BB962C8B-B14F-4D97-AF65-F5344CB8AC3E}">
@@ -8527,33 +8577,15 @@
                                   </p:childTnLst>
                                 </p:cTn>
                               </p:par>
-                            </p:childTnLst>
-                          </p:cTn>
-                        </p:par>
-                      </p:childTnLst>
-                    </p:cTn>
-                  </p:par>
-                  <p:par>
-                    <p:cTn id="17" fill="hold">
-                      <p:stCondLst>
-                        <p:cond delay="indefinite"/>
-                      </p:stCondLst>
-                      <p:childTnLst>
-                        <p:par>
-                          <p:cTn id="18" fill="hold">
-                            <p:stCondLst>
-                              <p:cond delay="0"/>
-                            </p:stCondLst>
-                            <p:childTnLst>
                               <p:par>
-                                <p:cTn id="19" presetID="42" presetClass="entr" presetSubtype="0" fill="hold" grpId="0" nodeType="clickEffect">
+                                <p:cTn id="17" presetID="42" presetClass="entr" presetSubtype="0" fill="hold" grpId="0" nodeType="withEffect">
                                   <p:stCondLst>
                                     <p:cond delay="0"/>
                                   </p:stCondLst>
                                   <p:childTnLst>
                                     <p:set>
                                       <p:cBhvr>
-                                        <p:cTn id="20" dur="1" fill="hold">
+                                        <p:cTn id="18" dur="1" fill="hold">
                                           <p:stCondLst>
                                             <p:cond delay="0"/>
                                           </p:stCondLst>
@@ -8575,7 +8607,7 @@
                                     </p:set>
                                     <p:animEffect transition="in" filter="fade">
                                       <p:cBhvr>
-                                        <p:cTn id="21" dur="1000"/>
+                                        <p:cTn id="19" dur="1000"/>
                                         <p:tgtEl>
                                           <p:spTgt spid="3">
                                             <p:txEl>
@@ -8587,7 +8619,7 @@
                                     </p:animEffect>
                                     <p:anim calcmode="lin" valueType="num">
                                       <p:cBhvr>
-                                        <p:cTn id="22" dur="1000" fill="hold"/>
+                                        <p:cTn id="20" dur="1000" fill="hold"/>
                                         <p:tgtEl>
                                           <p:spTgt spid="3">
                                             <p:txEl>
@@ -8614,11 +8646,223 @@
                                     </p:anim>
                                     <p:anim calcmode="lin" valueType="num">
                                       <p:cBhvr>
-                                        <p:cTn id="23" dur="1000" fill="hold"/>
+                                        <p:cTn id="21" dur="1000" fill="hold"/>
                                         <p:tgtEl>
                                           <p:spTgt spid="3">
                                             <p:txEl>
                                               <p:pRg st="2" end="2"/>
+                                            </p:txEl>
+                                          </p:spTgt>
+                                        </p:tgtEl>
+                                        <p:attrNameLst>
+                                          <p:attrName>ppt_y</p:attrName>
+                                        </p:attrNameLst>
+                                      </p:cBhvr>
+                                      <p:tavLst>
+                                        <p:tav tm="0">
+                                          <p:val>
+                                            <p:strVal val="#ppt_y+.1"/>
+                                          </p:val>
+                                        </p:tav>
+                                        <p:tav tm="100000">
+                                          <p:val>
+                                            <p:strVal val="#ppt_y"/>
+                                          </p:val>
+                                        </p:tav>
+                                      </p:tavLst>
+                                    </p:anim>
+                                  </p:childTnLst>
+                                </p:cTn>
+                              </p:par>
+                            </p:childTnLst>
+                          </p:cTn>
+                        </p:par>
+                      </p:childTnLst>
+                    </p:cTn>
+                  </p:par>
+                  <p:par>
+                    <p:cTn id="22" fill="hold">
+                      <p:stCondLst>
+                        <p:cond delay="indefinite"/>
+                      </p:stCondLst>
+                      <p:childTnLst>
+                        <p:par>
+                          <p:cTn id="23" fill="hold">
+                            <p:stCondLst>
+                              <p:cond delay="0"/>
+                            </p:stCondLst>
+                            <p:childTnLst>
+                              <p:par>
+                                <p:cTn id="24" presetID="42" presetClass="entr" presetSubtype="0" fill="hold" grpId="0" nodeType="clickEffect">
+                                  <p:stCondLst>
+                                    <p:cond delay="0"/>
+                                  </p:stCondLst>
+                                  <p:childTnLst>
+                                    <p:set>
+                                      <p:cBhvr>
+                                        <p:cTn id="25" dur="1" fill="hold">
+                                          <p:stCondLst>
+                                            <p:cond delay="0"/>
+                                          </p:stCondLst>
+                                        </p:cTn>
+                                        <p:tgtEl>
+                                          <p:spTgt spid="3">
+                                            <p:txEl>
+                                              <p:pRg st="3" end="3"/>
+                                            </p:txEl>
+                                          </p:spTgt>
+                                        </p:tgtEl>
+                                        <p:attrNameLst>
+                                          <p:attrName>style.visibility</p:attrName>
+                                        </p:attrNameLst>
+                                      </p:cBhvr>
+                                      <p:to>
+                                        <p:strVal val="visible"/>
+                                      </p:to>
+                                    </p:set>
+                                    <p:animEffect transition="in" filter="fade">
+                                      <p:cBhvr>
+                                        <p:cTn id="26" dur="1000"/>
+                                        <p:tgtEl>
+                                          <p:spTgt spid="3">
+                                            <p:txEl>
+                                              <p:pRg st="3" end="3"/>
+                                            </p:txEl>
+                                          </p:spTgt>
+                                        </p:tgtEl>
+                                      </p:cBhvr>
+                                    </p:animEffect>
+                                    <p:anim calcmode="lin" valueType="num">
+                                      <p:cBhvr>
+                                        <p:cTn id="27" dur="1000" fill="hold"/>
+                                        <p:tgtEl>
+                                          <p:spTgt spid="3">
+                                            <p:txEl>
+                                              <p:pRg st="3" end="3"/>
+                                            </p:txEl>
+                                          </p:spTgt>
+                                        </p:tgtEl>
+                                        <p:attrNameLst>
+                                          <p:attrName>ppt_x</p:attrName>
+                                        </p:attrNameLst>
+                                      </p:cBhvr>
+                                      <p:tavLst>
+                                        <p:tav tm="0">
+                                          <p:val>
+                                            <p:strVal val="#ppt_x"/>
+                                          </p:val>
+                                        </p:tav>
+                                        <p:tav tm="100000">
+                                          <p:val>
+                                            <p:strVal val="#ppt_x"/>
+                                          </p:val>
+                                        </p:tav>
+                                      </p:tavLst>
+                                    </p:anim>
+                                    <p:anim calcmode="lin" valueType="num">
+                                      <p:cBhvr>
+                                        <p:cTn id="28" dur="1000" fill="hold"/>
+                                        <p:tgtEl>
+                                          <p:spTgt spid="3">
+                                            <p:txEl>
+                                              <p:pRg st="3" end="3"/>
+                                            </p:txEl>
+                                          </p:spTgt>
+                                        </p:tgtEl>
+                                        <p:attrNameLst>
+                                          <p:attrName>ppt_y</p:attrName>
+                                        </p:attrNameLst>
+                                      </p:cBhvr>
+                                      <p:tavLst>
+                                        <p:tav tm="0">
+                                          <p:val>
+                                            <p:strVal val="#ppt_y+.1"/>
+                                          </p:val>
+                                        </p:tav>
+                                        <p:tav tm="100000">
+                                          <p:val>
+                                            <p:strVal val="#ppt_y"/>
+                                          </p:val>
+                                        </p:tav>
+                                      </p:tavLst>
+                                    </p:anim>
+                                  </p:childTnLst>
+                                </p:cTn>
+                              </p:par>
+                              <p:par>
+                                <p:cTn id="29" presetID="42" presetClass="entr" presetSubtype="0" fill="hold" grpId="0" nodeType="withEffect">
+                                  <p:stCondLst>
+                                    <p:cond delay="0"/>
+                                  </p:stCondLst>
+                                  <p:childTnLst>
+                                    <p:set>
+                                      <p:cBhvr>
+                                        <p:cTn id="30" dur="1" fill="hold">
+                                          <p:stCondLst>
+                                            <p:cond delay="0"/>
+                                          </p:stCondLst>
+                                        </p:cTn>
+                                        <p:tgtEl>
+                                          <p:spTgt spid="3">
+                                            <p:txEl>
+                                              <p:pRg st="4" end="4"/>
+                                            </p:txEl>
+                                          </p:spTgt>
+                                        </p:tgtEl>
+                                        <p:attrNameLst>
+                                          <p:attrName>style.visibility</p:attrName>
+                                        </p:attrNameLst>
+                                      </p:cBhvr>
+                                      <p:to>
+                                        <p:strVal val="visible"/>
+                                      </p:to>
+                                    </p:set>
+                                    <p:animEffect transition="in" filter="fade">
+                                      <p:cBhvr>
+                                        <p:cTn id="31" dur="1000"/>
+                                        <p:tgtEl>
+                                          <p:spTgt spid="3">
+                                            <p:txEl>
+                                              <p:pRg st="4" end="4"/>
+                                            </p:txEl>
+                                          </p:spTgt>
+                                        </p:tgtEl>
+                                      </p:cBhvr>
+                                    </p:animEffect>
+                                    <p:anim calcmode="lin" valueType="num">
+                                      <p:cBhvr>
+                                        <p:cTn id="32" dur="1000" fill="hold"/>
+                                        <p:tgtEl>
+                                          <p:spTgt spid="3">
+                                            <p:txEl>
+                                              <p:pRg st="4" end="4"/>
+                                            </p:txEl>
+                                          </p:spTgt>
+                                        </p:tgtEl>
+                                        <p:attrNameLst>
+                                          <p:attrName>ppt_x</p:attrName>
+                                        </p:attrNameLst>
+                                      </p:cBhvr>
+                                      <p:tavLst>
+                                        <p:tav tm="0">
+                                          <p:val>
+                                            <p:strVal val="#ppt_x"/>
+                                          </p:val>
+                                        </p:tav>
+                                        <p:tav tm="100000">
+                                          <p:val>
+                                            <p:strVal val="#ppt_x"/>
+                                          </p:val>
+                                        </p:tav>
+                                      </p:tavLst>
+                                    </p:anim>
+                                    <p:anim calcmode="lin" valueType="num">
+                                      <p:cBhvr>
+                                        <p:cTn id="33" dur="1000" fill="hold"/>
+                                        <p:tgtEl>
+                                          <p:spTgt spid="3">
+                                            <p:txEl>
+                                              <p:pRg st="4" end="4"/>
                                             </p:txEl>
                                           </p:spTgt>
                                         </p:tgtEl>
@@ -8759,6 +9003,36 @@
           </a:p>
         </p:txBody>
       </p:sp>
+      <p:pic>
+        <p:nvPicPr>
+          <p:cNvPr id="5" name="Image 4"/>
+          <p:cNvPicPr>
+            <a:picLocks noChangeAspect="1"/>
+          </p:cNvPicPr>
+          <p:nvPr/>
+        </p:nvPicPr>
+        <p:blipFill>
+          <a:blip r:embed="rId2">
+            <a:extLst>
+              <a:ext uri="{28A0092B-C50C-407E-A947-70E740481C1C}">
+                <a14:useLocalDpi xmlns:a14="http://schemas.microsoft.com/office/drawing/2010/main" val="0"/>
+              </a:ext>
+            </a:extLst>
+          </a:blip>
+          <a:stretch>
+            <a:fillRect/>
+          </a:stretch>
+        </p:blipFill>
+        <p:spPr>
+          <a:xfrm>
+            <a:off x="4068566" y="3601140"/>
+            <a:ext cx="5229546" cy="2941620"/>
+          </a:xfrm>
+          <a:prstGeom prst="rect">
+            <a:avLst/>
+          </a:prstGeom>
+        </p:spPr>
+      </p:pic>
     </p:spTree>
     <p:extLst>
       <p:ext uri="{BB962C8B-B14F-4D97-AF65-F5344CB8AC3E}">
@@ -8858,7 +9132,7 @@
         </p:nvSpPr>
         <p:spPr>
           <a:xfrm>
-            <a:off x="1444150" y="5156675"/>
+            <a:off x="1444150" y="4910099"/>
             <a:ext cx="5912147" cy="3217718"/>
           </a:xfrm>
           <a:prstGeom prst="rect">
@@ -9098,50 +9372,61 @@
           </a:lstStyle>
           <a:p>
             <a:r>
-              <a:rPr lang="fr-CH" dirty="0" err="1" smtClean="0"/>
+              <a:rPr lang="fr-CH" sz="1700" dirty="0" err="1" smtClean="0"/>
               <a:t>Mediacenter</a:t>
             </a:r>
-            <a:endParaRPr lang="fr-CH" dirty="0" smtClean="0"/>
+            <a:endParaRPr lang="fr-CH" sz="1700" dirty="0" smtClean="0"/>
           </a:p>
           <a:p>
             <a:pPr lvl="1"/>
             <a:r>
-              <a:rPr lang="fr-CH" dirty="0" smtClean="0"/>
+              <a:rPr lang="fr-CH" sz="1700" dirty="0" smtClean="0"/>
               <a:t>Lecteurs maisons</a:t>
             </a:r>
           </a:p>
           <a:p>
             <a:pPr lvl="1"/>
             <a:r>
-              <a:rPr lang="fr-CH" dirty="0" smtClean="0"/>
+              <a:rPr lang="fr-CH" sz="1700" dirty="0" smtClean="0"/>
               <a:t>Utilisation API (</a:t>
             </a:r>
             <a:r>
-              <a:rPr lang="fr-CH" dirty="0" err="1" smtClean="0"/>
+              <a:rPr lang="fr-CH" sz="1700" dirty="0" err="1" smtClean="0"/>
               <a:t>Spotify</a:t>
             </a:r>
             <a:r>
-              <a:rPr lang="fr-CH" dirty="0" smtClean="0"/>
+              <a:rPr lang="fr-CH" sz="1700" dirty="0" smtClean="0"/>
               <a:t>, </a:t>
             </a:r>
             <a:r>
-              <a:rPr lang="fr-CH" dirty="0" err="1" smtClean="0"/>
+              <a:rPr lang="fr-CH" sz="1700" dirty="0" err="1" smtClean="0"/>
               <a:t>OMDb</a:t>
             </a:r>
             <a:r>
-              <a:rPr lang="fr-CH" dirty="0" smtClean="0"/>
+              <a:rPr lang="fr-CH" sz="1700" dirty="0" smtClean="0"/>
               <a:t>)</a:t>
             </a:r>
           </a:p>
           <a:p>
             <a:pPr lvl="1"/>
             <a:r>
-              <a:rPr lang="fr-CH" dirty="0" smtClean="0"/>
+              <a:rPr lang="fr-CH" sz="1700" dirty="0" smtClean="0"/>
+              <a:t>Design Flat</a:t>
+            </a:r>
+          </a:p>
+          <a:p>
+            <a:pPr lvl="1"/>
+            <a:r>
+              <a:rPr lang="fr-CH" sz="1700" dirty="0"/>
               <a:t>Synchronisation</a:t>
             </a:r>
           </a:p>
           <a:p>
-            <a:endParaRPr lang="fr-CH" dirty="0"/>
+            <a:pPr lvl="1"/>
+            <a:endParaRPr lang="fr-CH" sz="1700" dirty="0" smtClean="0"/>
+          </a:p>
+          <a:p>
+            <a:endParaRPr lang="fr-CH" sz="1700" dirty="0"/>
           </a:p>
         </p:txBody>
       </p:sp>
@@ -9647,6 +9932,121 @@
                       </p:childTnLst>
                     </p:cTn>
                   </p:par>
+                  <p:par>
+                    <p:cTn id="31" fill="hold">
+                      <p:stCondLst>
+                        <p:cond delay="indefinite"/>
+                      </p:stCondLst>
+                      <p:childTnLst>
+                        <p:par>
+                          <p:cTn id="32" fill="hold">
+                            <p:stCondLst>
+                              <p:cond delay="0"/>
+                            </p:stCondLst>
+                            <p:childTnLst>
+                              <p:par>
+                                <p:cTn id="33" presetID="42" presetClass="entr" presetSubtype="0" fill="hold" nodeType="clickEffect">
+                                  <p:stCondLst>
+                                    <p:cond delay="0"/>
+                                  </p:stCondLst>
+                                  <p:childTnLst>
+                                    <p:set>
+                                      <p:cBhvr>
+                                        <p:cTn id="34" dur="1" fill="hold">
+                                          <p:stCondLst>
+                                            <p:cond delay="0"/>
+                                          </p:stCondLst>
+                                        </p:cTn>
+                                        <p:tgtEl>
+                                          <p:spTgt spid="7">
+                                            <p:txEl>
+                                              <p:pRg st="4" end="4"/>
+                                            </p:txEl>
+                                          </p:spTgt>
+                                        </p:tgtEl>
+                                        <p:attrNameLst>
+                                          <p:attrName>style.visibility</p:attrName>
+                                        </p:attrNameLst>
+                                      </p:cBhvr>
+                                      <p:to>
+                                        <p:strVal val="visible"/>
+                                      </p:to>
+                                    </p:set>
+                                    <p:animEffect transition="in" filter="fade">
+                                      <p:cBhvr>
+                                        <p:cTn id="35" dur="1000"/>
+                                        <p:tgtEl>
+                                          <p:spTgt spid="7">
+                                            <p:txEl>
+                                              <p:pRg st="4" end="4"/>
+                                            </p:txEl>
+                                          </p:spTgt>
+                                        </p:tgtEl>
+                                      </p:cBhvr>
+                                    </p:animEffect>
+                                    <p:anim calcmode="lin" valueType="num">
+                                      <p:cBhvr>
+                                        <p:cTn id="36" dur="1000" fill="hold"/>
+                                        <p:tgtEl>
+                                          <p:spTgt spid="7">
+                                            <p:txEl>
+                                              <p:pRg st="4" end="4"/>
+                                            </p:txEl>
+                                          </p:spTgt>
+                                        </p:tgtEl>
+                                        <p:attrNameLst>
+                                          <p:attrName>ppt_x</p:attrName>
+                                        </p:attrNameLst>
+                                      </p:cBhvr>
+                                      <p:tavLst>
+                                        <p:tav tm="0">
+                                          <p:val>
+                                            <p:strVal val="#ppt_x"/>
+                                          </p:val>
+                                        </p:tav>
+                                        <p:tav tm="100000">
+                                          <p:val>
+                                            <p:strVal val="#ppt_x"/>
+                                          </p:val>
+                                        </p:tav>
+                                      </p:tavLst>
+                                    </p:anim>
+                                    <p:anim calcmode="lin" valueType="num">
+                                      <p:cBhvr>
+                                        <p:cTn id="37" dur="1000" fill="hold"/>
+                                        <p:tgtEl>
+                                          <p:spTgt spid="7">
+                                            <p:txEl>
+                                              <p:pRg st="4" end="4"/>
+                                            </p:txEl>
+                                          </p:spTgt>
+                                        </p:tgtEl>
+                                        <p:attrNameLst>
+                                          <p:attrName>ppt_y</p:attrName>
+                                        </p:attrNameLst>
+                                      </p:cBhvr>
+                                      <p:tavLst>
+                                        <p:tav tm="0">
+                                          <p:val>
+                                            <p:strVal val="#ppt_y+.1"/>
+                                          </p:val>
+                                        </p:tav>
+                                        <p:tav tm="100000">
+                                          <p:val>
+                                            <p:strVal val="#ppt_y"/>
+                                          </p:val>
+                                        </p:tav>
+                                      </p:tavLst>
+                                    </p:anim>
+                                  </p:childTnLst>
+                                </p:cTn>
+                              </p:par>
+                            </p:childTnLst>
+                          </p:cTn>
+                        </p:par>
+                      </p:childTnLst>
+                    </p:cTn>
+                  </p:par>
                 </p:childTnLst>
               </p:cTn>
               <p:prevCondLst>
@@ -9748,8 +10148,16 @@
             <a:pPr lvl="1"/>
             <a:r>
               <a:rPr lang="fr-CH" dirty="0" smtClean="0"/>
-              <a:t>Nom | Adresse IP</a:t>
-            </a:r>
+              <a:t>Nom | Adresse </a:t>
+            </a:r>
+            <a:r>
+              <a:rPr lang="fr-CH" dirty="0" smtClean="0"/>
+              <a:t>IP</a:t>
+            </a:r>
+          </a:p>
+          <a:p>
+            <a:pPr lvl="1"/>
+            <a:endParaRPr lang="fr-CH" dirty="0" smtClean="0"/>
           </a:p>
           <a:p>
             <a:r>
@@ -9768,8 +10176,16 @@
             <a:pPr lvl="2"/>
             <a:r>
               <a:rPr lang="fr-CH" dirty="0" smtClean="0"/>
-              <a:t>Accepter ou refuser l’invitation</a:t>
-            </a:r>
+              <a:t>Accepter ou refuser </a:t>
+            </a:r>
+            <a:r>
+              <a:rPr lang="fr-CH" dirty="0" smtClean="0"/>
+              <a:t>l’invitation</a:t>
+            </a:r>
+          </a:p>
+          <a:p>
+            <a:pPr lvl="2"/>
+            <a:endParaRPr lang="fr-CH" dirty="0" smtClean="0"/>
           </a:p>
           <a:p>
             <a:r>
@@ -9835,12 +10251,53 @@
         </p:blipFill>
         <p:spPr>
           <a:xfrm>
-            <a:off x="6369892" y="1853248"/>
+            <a:off x="6349344" y="1608883"/>
             <a:ext cx="1890530" cy="1890530"/>
           </a:xfrm>
           <a:prstGeom prst="rect">
             <a:avLst/>
           </a:prstGeom>
+        </p:spPr>
+      </p:pic>
+      <p:pic>
+        <p:nvPicPr>
+          <p:cNvPr id="1026" name="Picture 2" descr="http://www.actuate.com/images/videoplaybutton.png"/>
+          <p:cNvPicPr>
+            <a:picLocks noChangeAspect="1" noChangeArrowheads="1"/>
+          </p:cNvPicPr>
+          <p:nvPr/>
+        </p:nvPicPr>
+        <p:blipFill>
+          <a:blip r:embed="rId3">
+            <a:extLst>
+              <a:ext uri="{28A0092B-C50C-407E-A947-70E740481C1C}">
+                <a14:useLocalDpi xmlns:a14="http://schemas.microsoft.com/office/drawing/2010/main" val="0"/>
+              </a:ext>
+            </a:extLst>
+          </a:blip>
+          <a:srcRect/>
+          <a:stretch>
+            <a:fillRect/>
+          </a:stretch>
+        </p:blipFill>
+        <p:spPr bwMode="auto">
+          <a:xfrm>
+            <a:off x="6425801" y="3530235"/>
+            <a:ext cx="1762703" cy="1762704"/>
+          </a:xfrm>
+          <a:prstGeom prst="rect">
+            <a:avLst/>
+          </a:prstGeom>
+          <a:noFill/>
+          <a:extLst>
+            <a:ext uri="{909E8E84-426E-40DD-AFC4-6F175D3DCCD1}">
+              <a14:hiddenFill xmlns:a14="http://schemas.microsoft.com/office/drawing/2010/main">
+                <a:solidFill>
+                  <a:srgbClr val="FFFFFF"/>
+                </a:solidFill>
+              </a14:hiddenFill>
+            </a:ext>
+          </a:extLst>
         </p:spPr>
       </p:pic>
     </p:spTree>
@@ -10182,7 +10639,7 @@
                                         <p:tgtEl>
                                           <p:spTgt spid="3">
                                             <p:txEl>
-                                              <p:pRg st="2" end="2"/>
+                                              <p:pRg st="3" end="3"/>
                                             </p:txEl>
                                           </p:spTgt>
                                         </p:tgtEl>
@@ -10200,7 +10657,7 @@
                                         <p:tgtEl>
                                           <p:spTgt spid="3">
                                             <p:txEl>
-                                              <p:pRg st="2" end="2"/>
+                                              <p:pRg st="3" end="3"/>
                                             </p:txEl>
                                           </p:spTgt>
                                         </p:tgtEl>
@@ -10212,7 +10669,7 @@
                                         <p:tgtEl>
                                           <p:spTgt spid="3">
                                             <p:txEl>
-                                              <p:pRg st="2" end="2"/>
+                                              <p:pRg st="3" end="3"/>
                                             </p:txEl>
                                           </p:spTgt>
                                         </p:tgtEl>
@@ -10239,7 +10696,7 @@
                                         <p:tgtEl>
                                           <p:spTgt spid="3">
                                             <p:txEl>
-                                              <p:pRg st="2" end="2"/>
+                                              <p:pRg st="3" end="3"/>
                                             </p:txEl>
                                           </p:spTgt>
                                         </p:tgtEl>
@@ -10279,7 +10736,7 @@
                                         <p:tgtEl>
                                           <p:spTgt spid="3">
                                             <p:txEl>
-                                              <p:pRg st="3" end="3"/>
+                                              <p:pRg st="4" end="4"/>
                                             </p:txEl>
                                           </p:spTgt>
                                         </p:tgtEl>
@@ -10297,7 +10754,7 @@
                                         <p:tgtEl>
                                           <p:spTgt spid="3">
                                             <p:txEl>
-                                              <p:pRg st="3" end="3"/>
+                                              <p:pRg st="4" end="4"/>
                                             </p:txEl>
                                           </p:spTgt>
                                         </p:tgtEl>
@@ -10309,7 +10766,7 @@
                                         <p:tgtEl>
                                           <p:spTgt spid="3">
                                             <p:txEl>
-                                              <p:pRg st="3" end="3"/>
+                                              <p:pRg st="4" end="4"/>
                                             </p:txEl>
                                           </p:spTgt>
                                         </p:tgtEl>
@@ -10336,7 +10793,7 @@
                                         <p:tgtEl>
                                           <p:spTgt spid="3">
                                             <p:txEl>
-                                              <p:pRg st="3" end="3"/>
+                                              <p:pRg st="4" end="4"/>
                                             </p:txEl>
                                           </p:spTgt>
                                         </p:tgtEl>
@@ -10376,7 +10833,7 @@
                                         <p:tgtEl>
                                           <p:spTgt spid="3">
                                             <p:txEl>
-                                              <p:pRg st="4" end="4"/>
+                                              <p:pRg st="5" end="5"/>
                                             </p:txEl>
                                           </p:spTgt>
                                         </p:tgtEl>
@@ -10394,7 +10851,7 @@
                                         <p:tgtEl>
                                           <p:spTgt spid="3">
                                             <p:txEl>
-                                              <p:pRg st="4" end="4"/>
+                                              <p:pRg st="5" end="5"/>
                                             </p:txEl>
                                           </p:spTgt>
                                         </p:tgtEl>
@@ -10406,7 +10863,7 @@
                                         <p:tgtEl>
                                           <p:spTgt spid="3">
                                             <p:txEl>
-                                              <p:pRg st="4" end="4"/>
+                                              <p:pRg st="5" end="5"/>
                                             </p:txEl>
                                           </p:spTgt>
                                         </p:tgtEl>
@@ -10433,9 +10890,90 @@
                                         <p:tgtEl>
                                           <p:spTgt spid="3">
                                             <p:txEl>
-                                              <p:pRg st="4" end="4"/>
+                                              <p:pRg st="5" end="5"/>
                                             </p:txEl>
                                           </p:spTgt>
+                                        </p:tgtEl>
+                                        <p:attrNameLst>
+                                          <p:attrName>ppt_y</p:attrName>
+                                        </p:attrNameLst>
+                                      </p:cBhvr>
+                                      <p:tavLst>
+                                        <p:tav tm="0">
+                                          <p:val>
+                                            <p:strVal val="#ppt_y+.1"/>
+                                          </p:val>
+                                        </p:tav>
+                                        <p:tav tm="100000">
+                                          <p:val>
+                                            <p:strVal val="#ppt_y"/>
+                                          </p:val>
+                                        </p:tav>
+                                      </p:tavLst>
+                                    </p:anim>
+                                  </p:childTnLst>
+                                </p:cTn>
+                              </p:par>
+                              <p:par>
+                                <p:cTn id="37" presetID="42" presetClass="entr" presetSubtype="0" fill="hold" nodeType="withEffect">
+                                  <p:stCondLst>
+                                    <p:cond delay="0"/>
+                                  </p:stCondLst>
+                                  <p:childTnLst>
+                                    <p:set>
+                                      <p:cBhvr>
+                                        <p:cTn id="38" dur="1" fill="hold">
+                                          <p:stCondLst>
+                                            <p:cond delay="0"/>
+                                          </p:stCondLst>
+                                        </p:cTn>
+                                        <p:tgtEl>
+                                          <p:spTgt spid="1026"/>
+                                        </p:tgtEl>
+                                        <p:attrNameLst>
+                                          <p:attrName>style.visibility</p:attrName>
+                                        </p:attrNameLst>
+                                      </p:cBhvr>
+                                      <p:to>
+                                        <p:strVal val="visible"/>
+                                      </p:to>
+                                    </p:set>
+                                    <p:animEffect transition="in" filter="fade">
+                                      <p:cBhvr>
+                                        <p:cTn id="39" dur="1000"/>
+                                        <p:tgtEl>
+                                          <p:spTgt spid="1026"/>
+                                        </p:tgtEl>
+                                      </p:cBhvr>
+                                    </p:animEffect>
+                                    <p:anim calcmode="lin" valueType="num">
+                                      <p:cBhvr>
+                                        <p:cTn id="40" dur="1000" fill="hold"/>
+                                        <p:tgtEl>
+                                          <p:spTgt spid="1026"/>
+                                        </p:tgtEl>
+                                        <p:attrNameLst>
+                                          <p:attrName>ppt_x</p:attrName>
+                                        </p:attrNameLst>
+                                      </p:cBhvr>
+                                      <p:tavLst>
+                                        <p:tav tm="0">
+                                          <p:val>
+                                            <p:strVal val="#ppt_x"/>
+                                          </p:val>
+                                        </p:tav>
+                                        <p:tav tm="100000">
+                                          <p:val>
+                                            <p:strVal val="#ppt_x"/>
+                                          </p:val>
+                                        </p:tav>
+                                      </p:tavLst>
+                                    </p:anim>
+                                    <p:anim calcmode="lin" valueType="num">
+                                      <p:cBhvr>
+                                        <p:cTn id="41" dur="1000" fill="hold"/>
+                                        <p:tgtEl>
+                                          <p:spTgt spid="1026"/>
                                         </p:tgtEl>
                                         <p:attrNameLst>
                                           <p:attrName>ppt_y</p:attrName>
@@ -10464,116 +11002,19 @@
                     </p:cTn>
                   </p:par>
                   <p:par>
-                    <p:cTn id="37" fill="hold">
+                    <p:cTn id="42" fill="hold">
                       <p:stCondLst>
                         <p:cond delay="indefinite"/>
                       </p:stCondLst>
                       <p:childTnLst>
                         <p:par>
-                          <p:cTn id="38" fill="hold">
+                          <p:cTn id="43" fill="hold">
                             <p:stCondLst>
                               <p:cond delay="0"/>
                             </p:stCondLst>
                             <p:childTnLst>
                               <p:par>
-                                <p:cTn id="39" presetID="42" presetClass="entr" presetSubtype="0" fill="hold" nodeType="clickEffect">
-                                  <p:stCondLst>
-                                    <p:cond delay="0"/>
-                                  </p:stCondLst>
-                                  <p:childTnLst>
-                                    <p:set>
-                                      <p:cBhvr>
-                                        <p:cTn id="40" dur="1" fill="hold">
-                                          <p:stCondLst>
-                                            <p:cond delay="0"/>
-                                          </p:stCondLst>
-                                        </p:cTn>
-                                        <p:tgtEl>
-                                          <p:spTgt spid="3">
-                                            <p:txEl>
-                                              <p:pRg st="5" end="5"/>
-                                            </p:txEl>
-                                          </p:spTgt>
-                                        </p:tgtEl>
-                                        <p:attrNameLst>
-                                          <p:attrName>style.visibility</p:attrName>
-                                        </p:attrNameLst>
-                                      </p:cBhvr>
-                                      <p:to>
-                                        <p:strVal val="visible"/>
-                                      </p:to>
-                                    </p:set>
-                                    <p:animEffect transition="in" filter="fade">
-                                      <p:cBhvr>
-                                        <p:cTn id="41" dur="1000"/>
-                                        <p:tgtEl>
-                                          <p:spTgt spid="3">
-                                            <p:txEl>
-                                              <p:pRg st="5" end="5"/>
-                                            </p:txEl>
-                                          </p:spTgt>
-                                        </p:tgtEl>
-                                      </p:cBhvr>
-                                    </p:animEffect>
-                                    <p:anim calcmode="lin" valueType="num">
-                                      <p:cBhvr>
-                                        <p:cTn id="42" dur="1000" fill="hold"/>
-                                        <p:tgtEl>
-                                          <p:spTgt spid="3">
-                                            <p:txEl>
-                                              <p:pRg st="5" end="5"/>
-                                            </p:txEl>
-                                          </p:spTgt>
-                                        </p:tgtEl>
-                                        <p:attrNameLst>
-                                          <p:attrName>ppt_x</p:attrName>
-                                        </p:attrNameLst>
-                                      </p:cBhvr>
-                                      <p:tavLst>
-                                        <p:tav tm="0">
-                                          <p:val>
-                                            <p:strVal val="#ppt_x"/>
-                                          </p:val>
-                                        </p:tav>
-                                        <p:tav tm="100000">
-                                          <p:val>
-                                            <p:strVal val="#ppt_x"/>
-                                          </p:val>
-                                        </p:tav>
-                                      </p:tavLst>
-                                    </p:anim>
-                                    <p:anim calcmode="lin" valueType="num">
-                                      <p:cBhvr>
-                                        <p:cTn id="43" dur="1000" fill="hold"/>
-                                        <p:tgtEl>
-                                          <p:spTgt spid="3">
-                                            <p:txEl>
-                                              <p:pRg st="5" end="5"/>
-                                            </p:txEl>
-                                          </p:spTgt>
-                                        </p:tgtEl>
-                                        <p:attrNameLst>
-                                          <p:attrName>ppt_y</p:attrName>
-                                        </p:attrNameLst>
-                                      </p:cBhvr>
-                                      <p:tavLst>
-                                        <p:tav tm="0">
-                                          <p:val>
-                                            <p:strVal val="#ppt_y+.1"/>
-                                          </p:val>
-                                        </p:tav>
-                                        <p:tav tm="100000">
-                                          <p:val>
-                                            <p:strVal val="#ppt_y"/>
-                                          </p:val>
-                                        </p:tav>
-                                      </p:tavLst>
-                                    </p:anim>
-                                  </p:childTnLst>
-                                </p:cTn>
-                              </p:par>
-                              <p:par>
-                                <p:cTn id="44" presetID="42" presetClass="entr" presetSubtype="0" fill="hold" nodeType="withEffect">
+                                <p:cTn id="44" presetID="42" presetClass="entr" presetSubtype="0" fill="hold" nodeType="clickEffect">
                                   <p:stCondLst>
                                     <p:cond delay="0"/>
                                   </p:stCondLst>
@@ -10588,7 +11029,7 @@
                                         <p:tgtEl>
                                           <p:spTgt spid="3">
                                             <p:txEl>
-                                              <p:pRg st="6" end="6"/>
+                                              <p:pRg st="7" end="7"/>
                                             </p:txEl>
                                           </p:spTgt>
                                         </p:tgtEl>
@@ -10606,7 +11047,7 @@
                                         <p:tgtEl>
                                           <p:spTgt spid="3">
                                             <p:txEl>
-                                              <p:pRg st="6" end="6"/>
+                                              <p:pRg st="7" end="7"/>
                                             </p:txEl>
                                           </p:spTgt>
                                         </p:tgtEl>
@@ -10618,7 +11059,7 @@
                                         <p:tgtEl>
                                           <p:spTgt spid="3">
                                             <p:txEl>
-                                              <p:pRg st="6" end="6"/>
+                                              <p:pRg st="7" end="7"/>
                                             </p:txEl>
                                           </p:spTgt>
                                         </p:tgtEl>
@@ -10645,7 +11086,104 @@
                                         <p:tgtEl>
                                           <p:spTgt spid="3">
                                             <p:txEl>
-                                              <p:pRg st="6" end="6"/>
+                                              <p:pRg st="7" end="7"/>
+                                            </p:txEl>
+                                          </p:spTgt>
+                                        </p:tgtEl>
+                                        <p:attrNameLst>
+                                          <p:attrName>ppt_y</p:attrName>
+                                        </p:attrNameLst>
+                                      </p:cBhvr>
+                                      <p:tavLst>
+                                        <p:tav tm="0">
+                                          <p:val>
+                                            <p:strVal val="#ppt_y+.1"/>
+                                          </p:val>
+                                        </p:tav>
+                                        <p:tav tm="100000">
+                                          <p:val>
+                                            <p:strVal val="#ppt_y"/>
+                                          </p:val>
+                                        </p:tav>
+                                      </p:tavLst>
+                                    </p:anim>
+                                  </p:childTnLst>
+                                </p:cTn>
+                              </p:par>
+                              <p:par>
+                                <p:cTn id="49" presetID="42" presetClass="entr" presetSubtype="0" fill="hold" nodeType="withEffect">
+                                  <p:stCondLst>
+                                    <p:cond delay="0"/>
+                                  </p:stCondLst>
+                                  <p:childTnLst>
+                                    <p:set>
+                                      <p:cBhvr>
+                                        <p:cTn id="50" dur="1" fill="hold">
+                                          <p:stCondLst>
+                                            <p:cond delay="0"/>
+                                          </p:stCondLst>
+                                        </p:cTn>
+                                        <p:tgtEl>
+                                          <p:spTgt spid="3">
+                                            <p:txEl>
+                                              <p:pRg st="8" end="8"/>
+                                            </p:txEl>
+                                          </p:spTgt>
+                                        </p:tgtEl>
+                                        <p:attrNameLst>
+                                          <p:attrName>style.visibility</p:attrName>
+                                        </p:attrNameLst>
+                                      </p:cBhvr>
+                                      <p:to>
+                                        <p:strVal val="visible"/>
+                                      </p:to>
+                                    </p:set>
+                                    <p:animEffect transition="in" filter="fade">
+                                      <p:cBhvr>
+                                        <p:cTn id="51" dur="1000"/>
+                                        <p:tgtEl>
+                                          <p:spTgt spid="3">
+                                            <p:txEl>
+                                              <p:pRg st="8" end="8"/>
+                                            </p:txEl>
+                                          </p:spTgt>
+                                        </p:tgtEl>
+                                      </p:cBhvr>
+                                    </p:animEffect>
+                                    <p:anim calcmode="lin" valueType="num">
+                                      <p:cBhvr>
+                                        <p:cTn id="52" dur="1000" fill="hold"/>
+                                        <p:tgtEl>
+                                          <p:spTgt spid="3">
+                                            <p:txEl>
+                                              <p:pRg st="8" end="8"/>
+                                            </p:txEl>
+                                          </p:spTgt>
+                                        </p:tgtEl>
+                                        <p:attrNameLst>
+                                          <p:attrName>ppt_x</p:attrName>
+                                        </p:attrNameLst>
+                                      </p:cBhvr>
+                                      <p:tavLst>
+                                        <p:tav tm="0">
+                                          <p:val>
+                                            <p:strVal val="#ppt_x"/>
+                                          </p:val>
+                                        </p:tav>
+                                        <p:tav tm="100000">
+                                          <p:val>
+                                            <p:strVal val="#ppt_x"/>
+                                          </p:val>
+                                        </p:tav>
+                                      </p:tavLst>
+                                    </p:anim>
+                                    <p:anim calcmode="lin" valueType="num">
+                                      <p:cBhvr>
+                                        <p:cTn id="53" dur="1000" fill="hold"/>
+                                        <p:tgtEl>
+                                          <p:spTgt spid="3">
+                                            <p:txEl>
+                                              <p:pRg st="8" end="8"/>
                                             </p:txEl>
                                           </p:spTgt>
                                         </p:tgtEl>
@@ -10783,6 +11321,47 @@
           </a:p>
         </p:txBody>
       </p:sp>
+      <p:pic>
+        <p:nvPicPr>
+          <p:cNvPr id="2050" name="Picture 2" descr="http://cdn.marketplaceimages.windowsphone.com/v8/images/8bde1338-e80c-4f06-a7a6-0003c1b742c0?imageType=ws_icon_large"/>
+          <p:cNvPicPr>
+            <a:picLocks noChangeAspect="1" noChangeArrowheads="1"/>
+          </p:cNvPicPr>
+          <p:nvPr/>
+        </p:nvPicPr>
+        <p:blipFill>
+          <a:blip r:embed="rId2">
+            <a:extLst>
+              <a:ext uri="{28A0092B-C50C-407E-A947-70E740481C1C}">
+                <a14:useLocalDpi xmlns:a14="http://schemas.microsoft.com/office/drawing/2010/main" val="0"/>
+              </a:ext>
+            </a:extLst>
+          </a:blip>
+          <a:srcRect/>
+          <a:stretch>
+            <a:fillRect/>
+          </a:stretch>
+        </p:blipFill>
+        <p:spPr bwMode="auto">
+          <a:xfrm>
+            <a:off x="6384169" y="4377811"/>
+            <a:ext cx="1977802" cy="1977803"/>
+          </a:xfrm>
+          <a:prstGeom prst="rect">
+            <a:avLst/>
+          </a:prstGeom>
+          <a:noFill/>
+          <a:extLst>
+            <a:ext uri="{909E8E84-426E-40DD-AFC4-6F175D3DCCD1}">
+              <a14:hiddenFill xmlns:a14="http://schemas.microsoft.com/office/drawing/2010/main">
+                <a:solidFill>
+                  <a:srgbClr val="FFFFFF"/>
+                </a:solidFill>
+              </a14:hiddenFill>
+            </a:ext>
+          </a:extLst>
+        </p:spPr>
+      </p:pic>
     </p:spTree>
     <p:extLst>
       <p:ext uri="{BB962C8B-B14F-4D97-AF65-F5344CB8AC3E}">
@@ -11611,8 +12190,8 @@
         </p:nvSpPr>
         <p:spPr>
           <a:xfrm>
-            <a:off x="2958957" y="3400742"/>
-            <a:ext cx="5640512" cy="1231106"/>
+            <a:off x="2928135" y="3688418"/>
+            <a:ext cx="5640512" cy="800219"/>
           </a:xfrm>
           <a:prstGeom prst="rect">
             <a:avLst/>
@@ -11651,22 +12230,6 @@
               <a:t>Interface </a:t>
             </a:r>
             <a:endParaRPr lang="fr-CH" sz="2800" b="1" u="sng" dirty="0" smtClean="0">
-              <a:solidFill>
-                <a:prstClr val="white"/>
-              </a:solidFill>
-            </a:endParaRPr>
-          </a:p>
-          <a:p>
-            <a:pPr lvl="0"/>
-            <a:r>
-              <a:rPr lang="fr-CH" sz="2800" dirty="0" smtClean="0">
-                <a:solidFill>
-                  <a:prstClr val="white"/>
-                </a:solidFill>
-              </a:rPr>
-              <a:t>sont peut-être sous-estimés</a:t>
-            </a:r>
-            <a:endParaRPr lang="fr-CH" sz="2800" dirty="0">
               <a:solidFill>
                 <a:prstClr val="white"/>
               </a:solidFill>

</xml_diff>

<commit_message>
Update Audio Player (buttons play/pause, prev, next) and final presentation export
</commit_message>
<xml_diff>
--- a/Présentation/Présentation intermédiaire.pptx
+++ b/Présentation/Présentation intermédiaire.pptx
@@ -17,9 +17,9 @@
     <p:sldId id="260" r:id="rId8"/>
     <p:sldId id="262" r:id="rId9"/>
     <p:sldId id="261" r:id="rId10"/>
-    <p:sldId id="264" r:id="rId11"/>
-    <p:sldId id="267" r:id="rId12"/>
-    <p:sldId id="268" r:id="rId13"/>
+    <p:sldId id="267" r:id="rId11"/>
+    <p:sldId id="268" r:id="rId12"/>
+    <p:sldId id="269" r:id="rId13"/>
   </p:sldIdLst>
   <p:sldSz cx="9144000" cy="6858000" type="screen4x3"/>
   <p:notesSz cx="6858000" cy="9144000"/>
@@ -6994,42 +6994,143 @@
           <a:p>
             <a:r>
               <a:rPr lang="fr-CH" dirty="0" smtClean="0"/>
-              <a:t>Éventuelles Slides supplémentaires ???</a:t>
+              <a:t>API </a:t>
+            </a:r>
+            <a:r>
+              <a:rPr lang="fr-CH" dirty="0" err="1" smtClean="0"/>
+              <a:t>Spotify</a:t>
+            </a:r>
+            <a:r>
+              <a:rPr lang="fr-CH" dirty="0" smtClean="0"/>
+              <a:t/>
             </a:r>
             <a:br>
               <a:rPr lang="fr-CH" dirty="0" smtClean="0"/>
             </a:br>
-            <a:r>
-              <a:rPr lang="fr-CH" dirty="0" smtClean="0"/>
-              <a:t>Ou</a:t>
-            </a:r>
-            <a:br>
-              <a:rPr lang="fr-CH" dirty="0" smtClean="0"/>
-            </a:br>
-            <a:r>
-              <a:rPr lang="fr-CH" dirty="0" smtClean="0"/>
-              <a:t>Démo live</a:t>
-            </a:r>
-            <a:endParaRPr lang="fr-CH" dirty="0"/>
-          </a:p>
-        </p:txBody>
-      </p:sp>
-      <p:sp>
-        <p:nvSpPr>
-          <p:cNvPr id="3" name="Espace réservé du texte 2"/>
-          <p:cNvSpPr>
-            <a:spLocks noGrp="1"/>
-          </p:cNvSpPr>
-          <p:nvPr>
-            <p:ph type="body" idx="1"/>
-          </p:nvPr>
-        </p:nvSpPr>
-        <p:spPr/>
-        <p:txBody>
-          <a:bodyPr/>
+            <a:endParaRPr lang="fr-CH" sz="1800" dirty="0"/>
+          </a:p>
+        </p:txBody>
+      </p:sp>
+      <p:sp>
+        <p:nvSpPr>
+          <p:cNvPr id="3" name="Espace réservé du contenu 2"/>
+          <p:cNvSpPr>
+            <a:spLocks noGrp="1"/>
+          </p:cNvSpPr>
+          <p:nvPr>
+            <p:ph idx="1"/>
+          </p:nvPr>
+        </p:nvSpPr>
+        <p:spPr>
+          <a:xfrm>
+            <a:off x="488656" y="2052925"/>
+            <a:ext cx="8275199" cy="4195481"/>
+          </a:xfrm>
+        </p:spPr>
+        <p:txBody>
+          <a:bodyPr>
+            <a:normAutofit lnSpcReduction="10000"/>
+          </a:bodyPr>
           <a:lstStyle/>
           <a:p>
-            <a:endParaRPr lang="fr-CH"/>
+            <a:r>
+              <a:rPr lang="fr-CH" sz="2400" dirty="0" err="1" smtClean="0"/>
+              <a:t>Fingerprint</a:t>
+            </a:r>
+            <a:r>
+              <a:rPr lang="fr-CH" sz="2400" dirty="0" smtClean="0"/>
+              <a:t> algorithme impossible</a:t>
+            </a:r>
+          </a:p>
+          <a:p>
+            <a:r>
+              <a:rPr lang="fr-CH" sz="2400" dirty="0" smtClean="0"/>
+              <a:t>On se base sur les </a:t>
+            </a:r>
+            <a:r>
+              <a:rPr lang="fr-CH" sz="2400" dirty="0" err="1" smtClean="0"/>
+              <a:t>métadatas</a:t>
+            </a:r>
+            <a:endParaRPr lang="fr-CH" sz="2400" dirty="0" smtClean="0"/>
+          </a:p>
+          <a:p>
+            <a:endParaRPr lang="fr-CH" sz="2400" dirty="0"/>
+          </a:p>
+          <a:p>
+            <a:r>
+              <a:rPr lang="fr-CH" sz="2400" dirty="0" smtClean="0"/>
+              <a:t>Pour les lire les </a:t>
+            </a:r>
+            <a:r>
+              <a:rPr lang="fr-CH" sz="2400" dirty="0" err="1" smtClean="0"/>
+              <a:t>métadatas</a:t>
+            </a:r>
+            <a:r>
+              <a:rPr lang="fr-CH" sz="2400" dirty="0" smtClean="0"/>
+              <a:t> des formats supportés :</a:t>
+            </a:r>
+          </a:p>
+          <a:p>
+            <a:pPr lvl="1"/>
+            <a:r>
+              <a:rPr lang="fr-CH" sz="2200" dirty="0">
+                <a:hlinkClick r:id="rId2"/>
+              </a:rPr>
+              <a:t>http://www.jthink.net/jaudiotagger</a:t>
+            </a:r>
+            <a:r>
+              <a:rPr lang="fr-CH" sz="2200" dirty="0" smtClean="0">
+                <a:hlinkClick r:id="rId2"/>
+              </a:rPr>
+              <a:t>/</a:t>
+            </a:r>
+            <a:endParaRPr lang="fr-CH" sz="2200" dirty="0" smtClean="0"/>
+          </a:p>
+          <a:p>
+            <a:endParaRPr lang="fr-CH" sz="2400" dirty="0"/>
+          </a:p>
+          <a:p>
+            <a:r>
+              <a:rPr lang="fr-CH" sz="2400" dirty="0" err="1" smtClean="0"/>
+              <a:t>Récupèrer</a:t>
+            </a:r>
+            <a:r>
+              <a:rPr lang="fr-CH" sz="2400" dirty="0" smtClean="0"/>
+              <a:t> les infos (pochette, année, etc.) via </a:t>
+            </a:r>
+            <a:r>
+              <a:rPr lang="fr-CH" sz="2400" dirty="0" err="1" smtClean="0"/>
+              <a:t>spotify</a:t>
+            </a:r>
+            <a:r>
+              <a:rPr lang="fr-CH" sz="2400" dirty="0" smtClean="0"/>
+              <a:t> API :</a:t>
+            </a:r>
+          </a:p>
+          <a:p>
+            <a:pPr lvl="1"/>
+            <a:r>
+              <a:rPr lang="fr-CH" sz="2200" dirty="0">
+                <a:hlinkClick r:id="rId3"/>
+              </a:rPr>
+              <a:t>https://</a:t>
+            </a:r>
+            <a:r>
+              <a:rPr lang="fr-CH" sz="2200" dirty="0" smtClean="0">
+                <a:hlinkClick r:id="rId3"/>
+              </a:rPr>
+              <a:t>github.com/thelinmichael/spotify-web-api-java</a:t>
+            </a:r>
+            <a:endParaRPr lang="fr-CH" sz="2200" dirty="0" smtClean="0"/>
+          </a:p>
+          <a:p>
+            <a:pPr marL="457207" lvl="1" indent="0">
+              <a:buNone/>
+            </a:pPr>
+            <a:endParaRPr lang="fr-CH" sz="2200" dirty="0"/>
+          </a:p>
+          <a:p>
+            <a:endParaRPr lang="fr-CH" sz="2400" dirty="0"/>
           </a:p>
         </p:txBody>
       </p:sp>
@@ -7060,7 +7161,7 @@
     </p:spTree>
     <p:extLst>
       <p:ext uri="{BB962C8B-B14F-4D97-AF65-F5344CB8AC3E}">
-        <p14:creationId xmlns:p14="http://schemas.microsoft.com/office/powerpoint/2010/main" val="2893678116"/>
+        <p14:creationId xmlns:p14="http://schemas.microsoft.com/office/powerpoint/2010/main" val="3891510886"/>
       </p:ext>
     </p:extLst>
   </p:cSld>
@@ -7111,15 +7212,7 @@
           <a:p>
             <a:r>
               <a:rPr lang="fr-CH" dirty="0" smtClean="0"/>
-              <a:t>API </a:t>
-            </a:r>
-            <a:r>
-              <a:rPr lang="fr-CH" dirty="0" err="1" smtClean="0"/>
-              <a:t>Spotify</a:t>
-            </a:r>
-            <a:r>
-              <a:rPr lang="fr-CH" dirty="0" smtClean="0"/>
-              <a:t/>
+              <a:t>Partie réseau</a:t>
             </a:r>
             <a:br>
               <a:rPr lang="fr-CH" dirty="0" smtClean="0"/>
@@ -7146,29 +7239,43 @@
         </p:spPr>
         <p:txBody>
           <a:bodyPr>
-            <a:normAutofit lnSpcReduction="10000"/>
+            <a:normAutofit fontScale="77500" lnSpcReduction="20000"/>
           </a:bodyPr>
           <a:lstStyle/>
           <a:p>
             <a:r>
+              <a:rPr lang="fr-CH" sz="2400" dirty="0" smtClean="0"/>
+              <a:t>Connection TCP</a:t>
+            </a:r>
+          </a:p>
+          <a:p>
+            <a:endParaRPr lang="fr-CH" sz="2400" dirty="0"/>
+          </a:p>
+          <a:p>
+            <a:r>
+              <a:rPr lang="fr-CH" sz="2400" dirty="0" smtClean="0"/>
+              <a:t>Un serveur démarre sur chaque client.</a:t>
+            </a:r>
+          </a:p>
+          <a:p>
+            <a:r>
+              <a:rPr lang="fr-CH" sz="2400" dirty="0" smtClean="0"/>
+              <a:t>Pour autoriser les connections, le serveur doit faire un «</a:t>
+            </a:r>
+            <a:r>
               <a:rPr lang="fr-CH" sz="2400" dirty="0" err="1" smtClean="0"/>
-              <a:t>Fingerprint</a:t>
+              <a:t>accept</a:t>
             </a:r>
             <a:r>
               <a:rPr lang="fr-CH" sz="2400" dirty="0" smtClean="0"/>
-              <a:t> algorithme impossible</a:t>
+              <a:t>».</a:t>
             </a:r>
           </a:p>
           <a:p>
             <a:r>
               <a:rPr lang="fr-CH" sz="2400" dirty="0" smtClean="0"/>
-              <a:t>On se base sur les </a:t>
-            </a:r>
-            <a:r>
-              <a:rPr lang="fr-CH" sz="2400" dirty="0" err="1" smtClean="0"/>
-              <a:t>métadatas</a:t>
-            </a:r>
-            <a:endParaRPr lang="fr-CH" sz="2400" dirty="0" smtClean="0"/>
+              <a:t>Le client donne l’IP et le port.</a:t>
+            </a:r>
           </a:p>
           <a:p>
             <a:endParaRPr lang="fr-CH" sz="2400" dirty="0"/>
@@ -7176,74 +7283,45 @@
           <a:p>
             <a:r>
               <a:rPr lang="fr-CH" sz="2400" dirty="0" smtClean="0"/>
-              <a:t>Pour les lire les </a:t>
-            </a:r>
-            <a:r>
-              <a:rPr lang="fr-CH" sz="2400" dirty="0" err="1" smtClean="0"/>
-              <a:t>métadatas</a:t>
-            </a:r>
-            <a:r>
-              <a:rPr lang="fr-CH" sz="2400" dirty="0" smtClean="0"/>
-              <a:t> des formats supportés :</a:t>
+              <a:t>Protocole défini pour la synchronisation</a:t>
             </a:r>
           </a:p>
           <a:p>
             <a:pPr lvl="1"/>
             <a:r>
-              <a:rPr lang="fr-CH" sz="2200" dirty="0">
-                <a:hlinkClick r:id="rId2"/>
-              </a:rPr>
-              <a:t>http://www.jthink.net/jaudiotagger</a:t>
-            </a:r>
-            <a:r>
-              <a:rPr lang="fr-CH" sz="2200" dirty="0" smtClean="0">
-                <a:hlinkClick r:id="rId2"/>
-              </a:rPr>
-              <a:t>/</a:t>
+              <a:rPr lang="fr-CH" sz="2200" dirty="0" smtClean="0"/>
+              <a:t>Begin</a:t>
+            </a:r>
+          </a:p>
+          <a:p>
+            <a:pPr lvl="1"/>
+            <a:r>
+              <a:rPr lang="fr-CH" sz="2200" dirty="0" smtClean="0"/>
+              <a:t>Pause</a:t>
+            </a:r>
+          </a:p>
+          <a:p>
+            <a:pPr lvl="1"/>
+            <a:r>
+              <a:rPr lang="fr-CH" sz="2200" dirty="0" err="1" smtClean="0"/>
+              <a:t>playAt</a:t>
             </a:r>
             <a:endParaRPr lang="fr-CH" sz="2200" dirty="0" smtClean="0"/>
           </a:p>
           <a:p>
-            <a:endParaRPr lang="fr-CH" sz="2400" dirty="0"/>
-          </a:p>
-          <a:p>
-            <a:r>
-              <a:rPr lang="fr-CH" sz="2400" dirty="0" err="1" smtClean="0"/>
-              <a:t>Récupèrer</a:t>
-            </a:r>
-            <a:r>
-              <a:rPr lang="fr-CH" sz="2400" dirty="0" smtClean="0"/>
-              <a:t> les infos (pochette, année, etc.) via </a:t>
-            </a:r>
-            <a:r>
-              <a:rPr lang="fr-CH" sz="2400" dirty="0" err="1" smtClean="0"/>
-              <a:t>spotify</a:t>
-            </a:r>
-            <a:r>
-              <a:rPr lang="fr-CH" sz="2400" dirty="0" smtClean="0"/>
-              <a:t> API :</a:t>
-            </a:r>
-          </a:p>
-          <a:p>
             <a:pPr lvl="1"/>
             <a:r>
-              <a:rPr lang="fr-CH" sz="2200" dirty="0">
-                <a:hlinkClick r:id="rId3"/>
-              </a:rPr>
-              <a:t>https://</a:t>
-            </a:r>
-            <a:r>
-              <a:rPr lang="fr-CH" sz="2200" dirty="0" smtClean="0">
-                <a:hlinkClick r:id="rId3"/>
-              </a:rPr>
-              <a:t>github.com/thelinmichael/spotify-web-api-java</a:t>
+              <a:rPr lang="fr-CH" sz="2200" dirty="0" err="1" smtClean="0"/>
+              <a:t>setAt</a:t>
             </a:r>
             <a:endParaRPr lang="fr-CH" sz="2200" dirty="0" smtClean="0"/>
           </a:p>
           <a:p>
-            <a:pPr marL="457207" lvl="1" indent="0">
-              <a:buNone/>
-            </a:pPr>
+            <a:pPr lvl="1"/>
+            <a:r>
+              <a:rPr lang="fr-CH" sz="2200" dirty="0" smtClean="0"/>
+              <a:t>bye</a:t>
+            </a:r>
             <a:endParaRPr lang="fr-CH" sz="2200" dirty="0"/>
           </a:p>
           <a:p>
@@ -7278,7 +7356,7 @@
     </p:spTree>
     <p:extLst>
       <p:ext uri="{BB962C8B-B14F-4D97-AF65-F5344CB8AC3E}">
-        <p14:creationId xmlns:p14="http://schemas.microsoft.com/office/powerpoint/2010/main" val="3891510886"/>
+        <p14:creationId xmlns:p14="http://schemas.microsoft.com/office/powerpoint/2010/main" val="2906578388"/>
       </p:ext>
     </p:extLst>
   </p:cSld>
@@ -7288,689 +7366,9 @@
   <p:timing>
     <p:tnLst>
       <p:par>
-        <p:cTn id="1" dur="indefinite" restart="never" nodeType="tmRoot">
-          <p:childTnLst>
-            <p:seq concurrent="1" nextAc="seek">
-              <p:cTn id="2" dur="indefinite" nodeType="mainSeq">
-                <p:childTnLst>
-                  <p:par>
-                    <p:cTn id="3" fill="hold">
-                      <p:stCondLst>
-                        <p:cond delay="indefinite"/>
-                      </p:stCondLst>
-                      <p:childTnLst>
-                        <p:par>
-                          <p:cTn id="4" fill="hold">
-                            <p:stCondLst>
-                              <p:cond delay="0"/>
-                            </p:stCondLst>
-                            <p:childTnLst>
-                              <p:par>
-                                <p:cTn id="5" presetID="42" presetClass="entr" presetSubtype="0" fill="hold" grpId="0" nodeType="clickEffect">
-                                  <p:stCondLst>
-                                    <p:cond delay="0"/>
-                                  </p:stCondLst>
-                                  <p:childTnLst>
-                                    <p:set>
-                                      <p:cBhvr>
-                                        <p:cTn id="6" dur="1" fill="hold">
-                                          <p:stCondLst>
-                                            <p:cond delay="0"/>
-                                          </p:stCondLst>
-                                        </p:cTn>
-                                        <p:tgtEl>
-                                          <p:spTgt spid="3">
-                                            <p:txEl>
-                                              <p:pRg st="0" end="0"/>
-                                            </p:txEl>
-                                          </p:spTgt>
-                                        </p:tgtEl>
-                                        <p:attrNameLst>
-                                          <p:attrName>style.visibility</p:attrName>
-                                        </p:attrNameLst>
-                                      </p:cBhvr>
-                                      <p:to>
-                                        <p:strVal val="visible"/>
-                                      </p:to>
-                                    </p:set>
-                                    <p:animEffect transition="in" filter="fade">
-                                      <p:cBhvr>
-                                        <p:cTn id="7" dur="1000"/>
-                                        <p:tgtEl>
-                                          <p:spTgt spid="3">
-                                            <p:txEl>
-                                              <p:pRg st="0" end="0"/>
-                                            </p:txEl>
-                                          </p:spTgt>
-                                        </p:tgtEl>
-                                      </p:cBhvr>
-                                    </p:animEffect>
-                                    <p:anim calcmode="lin" valueType="num">
-                                      <p:cBhvr>
-                                        <p:cTn id="8" dur="1000" fill="hold"/>
-                                        <p:tgtEl>
-                                          <p:spTgt spid="3">
-                                            <p:txEl>
-                                              <p:pRg st="0" end="0"/>
-                                            </p:txEl>
-                                          </p:spTgt>
-                                        </p:tgtEl>
-                                        <p:attrNameLst>
-                                          <p:attrName>ppt_x</p:attrName>
-                                        </p:attrNameLst>
-                                      </p:cBhvr>
-                                      <p:tavLst>
-                                        <p:tav tm="0">
-                                          <p:val>
-                                            <p:strVal val="#ppt_x"/>
-                                          </p:val>
-                                        </p:tav>
-                                        <p:tav tm="100000">
-                                          <p:val>
-                                            <p:strVal val="#ppt_x"/>
-                                          </p:val>
-                                        </p:tav>
-                                      </p:tavLst>
-                                    </p:anim>
-                                    <p:anim calcmode="lin" valueType="num">
-                                      <p:cBhvr>
-                                        <p:cTn id="9" dur="1000" fill="hold"/>
-                                        <p:tgtEl>
-                                          <p:spTgt spid="3">
-                                            <p:txEl>
-                                              <p:pRg st="0" end="0"/>
-                                            </p:txEl>
-                                          </p:spTgt>
-                                        </p:tgtEl>
-                                        <p:attrNameLst>
-                                          <p:attrName>ppt_y</p:attrName>
-                                        </p:attrNameLst>
-                                      </p:cBhvr>
-                                      <p:tavLst>
-                                        <p:tav tm="0">
-                                          <p:val>
-                                            <p:strVal val="#ppt_y+.1"/>
-                                          </p:val>
-                                        </p:tav>
-                                        <p:tav tm="100000">
-                                          <p:val>
-                                            <p:strVal val="#ppt_y"/>
-                                          </p:val>
-                                        </p:tav>
-                                      </p:tavLst>
-                                    </p:anim>
-                                  </p:childTnLst>
-                                </p:cTn>
-                              </p:par>
-                            </p:childTnLst>
-                          </p:cTn>
-                        </p:par>
-                      </p:childTnLst>
-                    </p:cTn>
-                  </p:par>
-                  <p:par>
-                    <p:cTn id="10" fill="hold">
-                      <p:stCondLst>
-                        <p:cond delay="indefinite"/>
-                      </p:stCondLst>
-                      <p:childTnLst>
-                        <p:par>
-                          <p:cTn id="11" fill="hold">
-                            <p:stCondLst>
-                              <p:cond delay="0"/>
-                            </p:stCondLst>
-                            <p:childTnLst>
-                              <p:par>
-                                <p:cTn id="12" presetID="42" presetClass="entr" presetSubtype="0" fill="hold" grpId="0" nodeType="clickEffect">
-                                  <p:stCondLst>
-                                    <p:cond delay="0"/>
-                                  </p:stCondLst>
-                                  <p:childTnLst>
-                                    <p:set>
-                                      <p:cBhvr>
-                                        <p:cTn id="13" dur="1" fill="hold">
-                                          <p:stCondLst>
-                                            <p:cond delay="0"/>
-                                          </p:stCondLst>
-                                        </p:cTn>
-                                        <p:tgtEl>
-                                          <p:spTgt spid="3">
-                                            <p:txEl>
-                                              <p:pRg st="1" end="1"/>
-                                            </p:txEl>
-                                          </p:spTgt>
-                                        </p:tgtEl>
-                                        <p:attrNameLst>
-                                          <p:attrName>style.visibility</p:attrName>
-                                        </p:attrNameLst>
-                                      </p:cBhvr>
-                                      <p:to>
-                                        <p:strVal val="visible"/>
-                                      </p:to>
-                                    </p:set>
-                                    <p:animEffect transition="in" filter="fade">
-                                      <p:cBhvr>
-                                        <p:cTn id="14" dur="1000"/>
-                                        <p:tgtEl>
-                                          <p:spTgt spid="3">
-                                            <p:txEl>
-                                              <p:pRg st="1" end="1"/>
-                                            </p:txEl>
-                                          </p:spTgt>
-                                        </p:tgtEl>
-                                      </p:cBhvr>
-                                    </p:animEffect>
-                                    <p:anim calcmode="lin" valueType="num">
-                                      <p:cBhvr>
-                                        <p:cTn id="15" dur="1000" fill="hold"/>
-                                        <p:tgtEl>
-                                          <p:spTgt spid="3">
-                                            <p:txEl>
-                                              <p:pRg st="1" end="1"/>
-                                            </p:txEl>
-                                          </p:spTgt>
-                                        </p:tgtEl>
-                                        <p:attrNameLst>
-                                          <p:attrName>ppt_x</p:attrName>
-                                        </p:attrNameLst>
-                                      </p:cBhvr>
-                                      <p:tavLst>
-                                        <p:tav tm="0">
-                                          <p:val>
-                                            <p:strVal val="#ppt_x"/>
-                                          </p:val>
-                                        </p:tav>
-                                        <p:tav tm="100000">
-                                          <p:val>
-                                            <p:strVal val="#ppt_x"/>
-                                          </p:val>
-                                        </p:tav>
-                                      </p:tavLst>
-                                    </p:anim>
-                                    <p:anim calcmode="lin" valueType="num">
-                                      <p:cBhvr>
-                                        <p:cTn id="16" dur="1000" fill="hold"/>
-                                        <p:tgtEl>
-                                          <p:spTgt spid="3">
-                                            <p:txEl>
-                                              <p:pRg st="1" end="1"/>
-                                            </p:txEl>
-                                          </p:spTgt>
-                                        </p:tgtEl>
-                                        <p:attrNameLst>
-                                          <p:attrName>ppt_y</p:attrName>
-                                        </p:attrNameLst>
-                                      </p:cBhvr>
-                                      <p:tavLst>
-                                        <p:tav tm="0">
-                                          <p:val>
-                                            <p:strVal val="#ppt_y+.1"/>
-                                          </p:val>
-                                        </p:tav>
-                                        <p:tav tm="100000">
-                                          <p:val>
-                                            <p:strVal val="#ppt_y"/>
-                                          </p:val>
-                                        </p:tav>
-                                      </p:tavLst>
-                                    </p:anim>
-                                  </p:childTnLst>
-                                </p:cTn>
-                              </p:par>
-                            </p:childTnLst>
-                          </p:cTn>
-                        </p:par>
-                      </p:childTnLst>
-                    </p:cTn>
-                  </p:par>
-                  <p:par>
-                    <p:cTn id="17" fill="hold">
-                      <p:stCondLst>
-                        <p:cond delay="indefinite"/>
-                      </p:stCondLst>
-                      <p:childTnLst>
-                        <p:par>
-                          <p:cTn id="18" fill="hold">
-                            <p:stCondLst>
-                              <p:cond delay="0"/>
-                            </p:stCondLst>
-                            <p:childTnLst>
-                              <p:par>
-                                <p:cTn id="19" presetID="42" presetClass="entr" presetSubtype="0" fill="hold" grpId="0" nodeType="clickEffect">
-                                  <p:stCondLst>
-                                    <p:cond delay="0"/>
-                                  </p:stCondLst>
-                                  <p:childTnLst>
-                                    <p:set>
-                                      <p:cBhvr>
-                                        <p:cTn id="20" dur="1" fill="hold">
-                                          <p:stCondLst>
-                                            <p:cond delay="0"/>
-                                          </p:stCondLst>
-                                        </p:cTn>
-                                        <p:tgtEl>
-                                          <p:spTgt spid="3">
-                                            <p:txEl>
-                                              <p:pRg st="3" end="3"/>
-                                            </p:txEl>
-                                          </p:spTgt>
-                                        </p:tgtEl>
-                                        <p:attrNameLst>
-                                          <p:attrName>style.visibility</p:attrName>
-                                        </p:attrNameLst>
-                                      </p:cBhvr>
-                                      <p:to>
-                                        <p:strVal val="visible"/>
-                                      </p:to>
-                                    </p:set>
-                                    <p:animEffect transition="in" filter="fade">
-                                      <p:cBhvr>
-                                        <p:cTn id="21" dur="1000"/>
-                                        <p:tgtEl>
-                                          <p:spTgt spid="3">
-                                            <p:txEl>
-                                              <p:pRg st="3" end="3"/>
-                                            </p:txEl>
-                                          </p:spTgt>
-                                        </p:tgtEl>
-                                      </p:cBhvr>
-                                    </p:animEffect>
-                                    <p:anim calcmode="lin" valueType="num">
-                                      <p:cBhvr>
-                                        <p:cTn id="22" dur="1000" fill="hold"/>
-                                        <p:tgtEl>
-                                          <p:spTgt spid="3">
-                                            <p:txEl>
-                                              <p:pRg st="3" end="3"/>
-                                            </p:txEl>
-                                          </p:spTgt>
-                                        </p:tgtEl>
-                                        <p:attrNameLst>
-                                          <p:attrName>ppt_x</p:attrName>
-                                        </p:attrNameLst>
-                                      </p:cBhvr>
-                                      <p:tavLst>
-                                        <p:tav tm="0">
-                                          <p:val>
-                                            <p:strVal val="#ppt_x"/>
-                                          </p:val>
-                                        </p:tav>
-                                        <p:tav tm="100000">
-                                          <p:val>
-                                            <p:strVal val="#ppt_x"/>
-                                          </p:val>
-                                        </p:tav>
-                                      </p:tavLst>
-                                    </p:anim>
-                                    <p:anim calcmode="lin" valueType="num">
-                                      <p:cBhvr>
-                                        <p:cTn id="23" dur="1000" fill="hold"/>
-                                        <p:tgtEl>
-                                          <p:spTgt spid="3">
-                                            <p:txEl>
-                                              <p:pRg st="3" end="3"/>
-                                            </p:txEl>
-                                          </p:spTgt>
-                                        </p:tgtEl>
-                                        <p:attrNameLst>
-                                          <p:attrName>ppt_y</p:attrName>
-                                        </p:attrNameLst>
-                                      </p:cBhvr>
-                                      <p:tavLst>
-                                        <p:tav tm="0">
-                                          <p:val>
-                                            <p:strVal val="#ppt_y+.1"/>
-                                          </p:val>
-                                        </p:tav>
-                                        <p:tav tm="100000">
-                                          <p:val>
-                                            <p:strVal val="#ppt_y"/>
-                                          </p:val>
-                                        </p:tav>
-                                      </p:tavLst>
-                                    </p:anim>
-                                  </p:childTnLst>
-                                </p:cTn>
-                              </p:par>
-                              <p:par>
-                                <p:cTn id="24" presetID="42" presetClass="entr" presetSubtype="0" fill="hold" grpId="0" nodeType="withEffect">
-                                  <p:stCondLst>
-                                    <p:cond delay="0"/>
-                                  </p:stCondLst>
-                                  <p:childTnLst>
-                                    <p:set>
-                                      <p:cBhvr>
-                                        <p:cTn id="25" dur="1" fill="hold">
-                                          <p:stCondLst>
-                                            <p:cond delay="0"/>
-                                          </p:stCondLst>
-                                        </p:cTn>
-                                        <p:tgtEl>
-                                          <p:spTgt spid="3">
-                                            <p:txEl>
-                                              <p:pRg st="4" end="4"/>
-                                            </p:txEl>
-                                          </p:spTgt>
-                                        </p:tgtEl>
-                                        <p:attrNameLst>
-                                          <p:attrName>style.visibility</p:attrName>
-                                        </p:attrNameLst>
-                                      </p:cBhvr>
-                                      <p:to>
-                                        <p:strVal val="visible"/>
-                                      </p:to>
-                                    </p:set>
-                                    <p:animEffect transition="in" filter="fade">
-                                      <p:cBhvr>
-                                        <p:cTn id="26" dur="1000"/>
-                                        <p:tgtEl>
-                                          <p:spTgt spid="3">
-                                            <p:txEl>
-                                              <p:pRg st="4" end="4"/>
-                                            </p:txEl>
-                                          </p:spTgt>
-                                        </p:tgtEl>
-                                      </p:cBhvr>
-                                    </p:animEffect>
-                                    <p:anim calcmode="lin" valueType="num">
-                                      <p:cBhvr>
-                                        <p:cTn id="27" dur="1000" fill="hold"/>
-                                        <p:tgtEl>
-                                          <p:spTgt spid="3">
-                                            <p:txEl>
-                                              <p:pRg st="4" end="4"/>
-                                            </p:txEl>
-                                          </p:spTgt>
-                                        </p:tgtEl>
-                                        <p:attrNameLst>
-                                          <p:attrName>ppt_x</p:attrName>
-                                        </p:attrNameLst>
-                                      </p:cBhvr>
-                                      <p:tavLst>
-                                        <p:tav tm="0">
-                                          <p:val>
-                                            <p:strVal val="#ppt_x"/>
-                                          </p:val>
-                                        </p:tav>
-                                        <p:tav tm="100000">
-                                          <p:val>
-                                            <p:strVal val="#ppt_x"/>
-                                          </p:val>
-                                        </p:tav>
-                                      </p:tavLst>
-                                    </p:anim>
-                                    <p:anim calcmode="lin" valueType="num">
-                                      <p:cBhvr>
-                                        <p:cTn id="28" dur="1000" fill="hold"/>
-                                        <p:tgtEl>
-                                          <p:spTgt spid="3">
-                                            <p:txEl>
-                                              <p:pRg st="4" end="4"/>
-                                            </p:txEl>
-                                          </p:spTgt>
-                                        </p:tgtEl>
-                                        <p:attrNameLst>
-                                          <p:attrName>ppt_y</p:attrName>
-                                        </p:attrNameLst>
-                                      </p:cBhvr>
-                                      <p:tavLst>
-                                        <p:tav tm="0">
-                                          <p:val>
-                                            <p:strVal val="#ppt_y+.1"/>
-                                          </p:val>
-                                        </p:tav>
-                                        <p:tav tm="100000">
-                                          <p:val>
-                                            <p:strVal val="#ppt_y"/>
-                                          </p:val>
-                                        </p:tav>
-                                      </p:tavLst>
-                                    </p:anim>
-                                  </p:childTnLst>
-                                </p:cTn>
-                              </p:par>
-                            </p:childTnLst>
-                          </p:cTn>
-                        </p:par>
-                      </p:childTnLst>
-                    </p:cTn>
-                  </p:par>
-                  <p:par>
-                    <p:cTn id="29" fill="hold">
-                      <p:stCondLst>
-                        <p:cond delay="indefinite"/>
-                      </p:stCondLst>
-                      <p:childTnLst>
-                        <p:par>
-                          <p:cTn id="30" fill="hold">
-                            <p:stCondLst>
-                              <p:cond delay="0"/>
-                            </p:stCondLst>
-                            <p:childTnLst>
-                              <p:par>
-                                <p:cTn id="31" presetID="42" presetClass="entr" presetSubtype="0" fill="hold" grpId="0" nodeType="clickEffect">
-                                  <p:stCondLst>
-                                    <p:cond delay="0"/>
-                                  </p:stCondLst>
-                                  <p:childTnLst>
-                                    <p:set>
-                                      <p:cBhvr>
-                                        <p:cTn id="32" dur="1" fill="hold">
-                                          <p:stCondLst>
-                                            <p:cond delay="0"/>
-                                          </p:stCondLst>
-                                        </p:cTn>
-                                        <p:tgtEl>
-                                          <p:spTgt spid="3">
-                                            <p:txEl>
-                                              <p:pRg st="6" end="6"/>
-                                            </p:txEl>
-                                          </p:spTgt>
-                                        </p:tgtEl>
-                                        <p:attrNameLst>
-                                          <p:attrName>style.visibility</p:attrName>
-                                        </p:attrNameLst>
-                                      </p:cBhvr>
-                                      <p:to>
-                                        <p:strVal val="visible"/>
-                                      </p:to>
-                                    </p:set>
-                                    <p:animEffect transition="in" filter="fade">
-                                      <p:cBhvr>
-                                        <p:cTn id="33" dur="1000"/>
-                                        <p:tgtEl>
-                                          <p:spTgt spid="3">
-                                            <p:txEl>
-                                              <p:pRg st="6" end="6"/>
-                                            </p:txEl>
-                                          </p:spTgt>
-                                        </p:tgtEl>
-                                      </p:cBhvr>
-                                    </p:animEffect>
-                                    <p:anim calcmode="lin" valueType="num">
-                                      <p:cBhvr>
-                                        <p:cTn id="34" dur="1000" fill="hold"/>
-                                        <p:tgtEl>
-                                          <p:spTgt spid="3">
-                                            <p:txEl>
-                                              <p:pRg st="6" end="6"/>
-                                            </p:txEl>
-                                          </p:spTgt>
-                                        </p:tgtEl>
-                                        <p:attrNameLst>
-                                          <p:attrName>ppt_x</p:attrName>
-                                        </p:attrNameLst>
-                                      </p:cBhvr>
-                                      <p:tavLst>
-                                        <p:tav tm="0">
-                                          <p:val>
-                                            <p:strVal val="#ppt_x"/>
-                                          </p:val>
-                                        </p:tav>
-                                        <p:tav tm="100000">
-                                          <p:val>
-                                            <p:strVal val="#ppt_x"/>
-                                          </p:val>
-                                        </p:tav>
-                                      </p:tavLst>
-                                    </p:anim>
-                                    <p:anim calcmode="lin" valueType="num">
-                                      <p:cBhvr>
-                                        <p:cTn id="35" dur="1000" fill="hold"/>
-                                        <p:tgtEl>
-                                          <p:spTgt spid="3">
-                                            <p:txEl>
-                                              <p:pRg st="6" end="6"/>
-                                            </p:txEl>
-                                          </p:spTgt>
-                                        </p:tgtEl>
-                                        <p:attrNameLst>
-                                          <p:attrName>ppt_y</p:attrName>
-                                        </p:attrNameLst>
-                                      </p:cBhvr>
-                                      <p:tavLst>
-                                        <p:tav tm="0">
-                                          <p:val>
-                                            <p:strVal val="#ppt_y+.1"/>
-                                          </p:val>
-                                        </p:tav>
-                                        <p:tav tm="100000">
-                                          <p:val>
-                                            <p:strVal val="#ppt_y"/>
-                                          </p:val>
-                                        </p:tav>
-                                      </p:tavLst>
-                                    </p:anim>
-                                  </p:childTnLst>
-                                </p:cTn>
-                              </p:par>
-                              <p:par>
-                                <p:cTn id="36" presetID="42" presetClass="entr" presetSubtype="0" fill="hold" grpId="0" nodeType="withEffect">
-                                  <p:stCondLst>
-                                    <p:cond delay="0"/>
-                                  </p:stCondLst>
-                                  <p:childTnLst>
-                                    <p:set>
-                                      <p:cBhvr>
-                                        <p:cTn id="37" dur="1" fill="hold">
-                                          <p:stCondLst>
-                                            <p:cond delay="0"/>
-                                          </p:stCondLst>
-                                        </p:cTn>
-                                        <p:tgtEl>
-                                          <p:spTgt spid="3">
-                                            <p:txEl>
-                                              <p:pRg st="7" end="7"/>
-                                            </p:txEl>
-                                          </p:spTgt>
-                                        </p:tgtEl>
-                                        <p:attrNameLst>
-                                          <p:attrName>style.visibility</p:attrName>
-                                        </p:attrNameLst>
-                                      </p:cBhvr>
-                                      <p:to>
-                                        <p:strVal val="visible"/>
-                                      </p:to>
-                                    </p:set>
-                                    <p:animEffect transition="in" filter="fade">
-                                      <p:cBhvr>
-                                        <p:cTn id="38" dur="1000"/>
-                                        <p:tgtEl>
-                                          <p:spTgt spid="3">
-                                            <p:txEl>
-                                              <p:pRg st="7" end="7"/>
-                                            </p:txEl>
-                                          </p:spTgt>
-                                        </p:tgtEl>
-                                      </p:cBhvr>
-                                    </p:animEffect>
-                                    <p:anim calcmode="lin" valueType="num">
-                                      <p:cBhvr>
-                                        <p:cTn id="39" dur="1000" fill="hold"/>
-                                        <p:tgtEl>
-                                          <p:spTgt spid="3">
-                                            <p:txEl>
-                                              <p:pRg st="7" end="7"/>
-                                            </p:txEl>
-                                          </p:spTgt>
-                                        </p:tgtEl>
-                                        <p:attrNameLst>
-                                          <p:attrName>ppt_x</p:attrName>
-                                        </p:attrNameLst>
-                                      </p:cBhvr>
-                                      <p:tavLst>
-                                        <p:tav tm="0">
-                                          <p:val>
-                                            <p:strVal val="#ppt_x"/>
-                                          </p:val>
-                                        </p:tav>
-                                        <p:tav tm="100000">
-                                          <p:val>
-                                            <p:strVal val="#ppt_x"/>
-                                          </p:val>
-                                        </p:tav>
-                                      </p:tavLst>
-                                    </p:anim>
-                                    <p:anim calcmode="lin" valueType="num">
-                                      <p:cBhvr>
-                                        <p:cTn id="40" dur="1000" fill="hold"/>
-                                        <p:tgtEl>
-                                          <p:spTgt spid="3">
-                                            <p:txEl>
-                                              <p:pRg st="7" end="7"/>
-                                            </p:txEl>
-                                          </p:spTgt>
-                                        </p:tgtEl>
-                                        <p:attrNameLst>
-                                          <p:attrName>ppt_y</p:attrName>
-                                        </p:attrNameLst>
-                                      </p:cBhvr>
-                                      <p:tavLst>
-                                        <p:tav tm="0">
-                                          <p:val>
-                                            <p:strVal val="#ppt_y+.1"/>
-                                          </p:val>
-                                        </p:tav>
-                                        <p:tav tm="100000">
-                                          <p:val>
-                                            <p:strVal val="#ppt_y"/>
-                                          </p:val>
-                                        </p:tav>
-                                      </p:tavLst>
-                                    </p:anim>
-                                  </p:childTnLst>
-                                </p:cTn>
-                              </p:par>
-                            </p:childTnLst>
-                          </p:cTn>
-                        </p:par>
-                      </p:childTnLst>
-                    </p:cTn>
-                  </p:par>
-                </p:childTnLst>
-              </p:cTn>
-              <p:prevCondLst>
-                <p:cond evt="onPrev" delay="0">
-                  <p:tgtEl>
-                    <p:sldTgt/>
-                  </p:tgtEl>
-                </p:cond>
-              </p:prevCondLst>
-              <p:nextCondLst>
-                <p:cond evt="onNext" delay="0">
-                  <p:tgtEl>
-                    <p:sldTgt/>
-                  </p:tgtEl>
-                </p:cond>
-              </p:nextCondLst>
-            </p:seq>
-          </p:childTnLst>
-        </p:cTn>
+        <p:cTn id="1" dur="indefinite" restart="never" nodeType="tmRoot"/>
       </p:par>
     </p:tnLst>
-    <p:bldLst>
-      <p:bldP spid="3" grpId="0" build="p"/>
-    </p:bldLst>
   </p:timing>
 </p:sld>
 </file>
@@ -8008,8 +7406,16 @@
           <a:lstStyle/>
           <a:p>
             <a:r>
+              <a:rPr lang="fr-CH" dirty="0" err="1" smtClean="0"/>
+              <a:t>OMDb</a:t>
+            </a:r>
+            <a:r>
               <a:rPr lang="fr-CH" dirty="0" smtClean="0"/>
-              <a:t>Partie réseau</a:t>
+              <a:t> API</a:t>
+            </a:r>
+            <a:r>
+              <a:rPr lang="fr-CH" dirty="0" smtClean="0"/>
+              <a:t/>
             </a:r>
             <a:br>
               <a:rPr lang="fr-CH" dirty="0" smtClean="0"/>
@@ -8036,13 +7442,13 @@
         </p:spPr>
         <p:txBody>
           <a:bodyPr>
-            <a:normAutofit fontScale="77500" lnSpcReduction="20000"/>
+            <a:normAutofit/>
           </a:bodyPr>
           <a:lstStyle/>
           <a:p>
             <a:r>
               <a:rPr lang="fr-CH" sz="2400" dirty="0" smtClean="0"/>
-              <a:t>Connection TCP</a:t>
+              <a:t>Récupération des métadonnées</a:t>
             </a:r>
           </a:p>
           <a:p>
@@ -8051,78 +7457,21 @@
           <a:p>
             <a:r>
               <a:rPr lang="fr-CH" sz="2400" dirty="0" smtClean="0"/>
-              <a:t>Un serveur démarre sur chaque client.</a:t>
-            </a:r>
-          </a:p>
-          <a:p>
+              <a:t>Utilisation d'</a:t>
+            </a:r>
+            <a:r>
+              <a:rPr lang="fr-CH" sz="2400" dirty="0" err="1" smtClean="0"/>
+              <a:t>OMDb</a:t>
+            </a:r>
             <a:r>
               <a:rPr lang="fr-CH" sz="2400" dirty="0" smtClean="0"/>
-              <a:t>Pour autoriser les connections, le serveur doit faire un «</a:t>
-            </a:r>
-            <a:r>
-              <a:rPr lang="fr-CH" sz="2400" dirty="0" err="1" smtClean="0"/>
-              <a:t>accept</a:t>
-            </a:r>
-            <a:r>
-              <a:rPr lang="fr-CH" sz="2400" dirty="0" smtClean="0"/>
-              <a:t>».</a:t>
-            </a:r>
-          </a:p>
-          <a:p>
-            <a:r>
-              <a:rPr lang="fr-CH" sz="2400" dirty="0" smtClean="0"/>
-              <a:t>Le client donne l’IP et le port.</a:t>
-            </a:r>
-          </a:p>
-          <a:p>
-            <a:endParaRPr lang="fr-CH" sz="2400" dirty="0"/>
-          </a:p>
-          <a:p>
-            <a:r>
-              <a:rPr lang="fr-CH" sz="2400" dirty="0" smtClean="0"/>
-              <a:t>Protocole défini pour la synchronisation</a:t>
-            </a:r>
-          </a:p>
-          <a:p>
-            <a:pPr lvl="1"/>
-            <a:r>
-              <a:rPr lang="fr-CH" sz="2200" dirty="0" smtClean="0"/>
-              <a:t>Begin</a:t>
-            </a:r>
-          </a:p>
-          <a:p>
-            <a:pPr lvl="1"/>
-            <a:r>
-              <a:rPr lang="fr-CH" sz="2200" dirty="0" smtClean="0"/>
-              <a:t>Pause</a:t>
-            </a:r>
-          </a:p>
-          <a:p>
-            <a:pPr lvl="1"/>
-            <a:r>
-              <a:rPr lang="fr-CH" sz="2200" dirty="0" err="1" smtClean="0"/>
-              <a:t>playAt</a:t>
-            </a:r>
-            <a:endParaRPr lang="fr-CH" sz="2200" dirty="0" smtClean="0"/>
-          </a:p>
-          <a:p>
-            <a:pPr lvl="1"/>
-            <a:r>
-              <a:rPr lang="fr-CH" sz="2200" dirty="0" err="1" smtClean="0"/>
-              <a:t>setAt</a:t>
-            </a:r>
-            <a:endParaRPr lang="fr-CH" sz="2200" dirty="0" smtClean="0"/>
-          </a:p>
-          <a:p>
-            <a:pPr lvl="1"/>
-            <a:r>
-              <a:rPr lang="fr-CH" sz="2200" dirty="0" smtClean="0"/>
-              <a:t>bye</a:t>
-            </a:r>
-            <a:endParaRPr lang="fr-CH" sz="2200" dirty="0"/>
-          </a:p>
-          <a:p>
-            <a:endParaRPr lang="fr-CH" sz="2400" dirty="0"/>
+              <a:t> </a:t>
+            </a:r>
+            <a:r>
+              <a:rPr lang="fr-CH" sz="2400" dirty="0"/>
+              <a:t>API pour récupérer les informations des vidéos (affiche, intrigue, etc.)</a:t>
+            </a:r>
+            <a:endParaRPr lang="fr-CH" sz="2400" dirty="0" smtClean="0"/>
           </a:p>
         </p:txBody>
       </p:sp>
@@ -8153,7 +7502,7 @@
     </p:spTree>
     <p:extLst>
       <p:ext uri="{BB962C8B-B14F-4D97-AF65-F5344CB8AC3E}">
-        <p14:creationId xmlns:p14="http://schemas.microsoft.com/office/powerpoint/2010/main" val="2906578388"/>
+        <p14:creationId xmlns:p14="http://schemas.microsoft.com/office/powerpoint/2010/main" val="2577665412"/>
       </p:ext>
     </p:extLst>
   </p:cSld>
@@ -8243,11 +7592,7 @@
           <a:p>
             <a:r>
               <a:rPr lang="fr-CH" sz="2400" dirty="0" smtClean="0"/>
-              <a:t>Avancement du </a:t>
-            </a:r>
-            <a:r>
-              <a:rPr lang="fr-CH" sz="2400" dirty="0" smtClean="0"/>
-              <a:t>projet</a:t>
+              <a:t>Avancement du projet</a:t>
             </a:r>
           </a:p>
           <a:p>
@@ -8256,16 +7601,11 @@
               <a:rPr lang="fr-CH" sz="2200" dirty="0" smtClean="0"/>
               <a:t>Par rapport à la planification</a:t>
             </a:r>
-            <a:endParaRPr lang="fr-CH" sz="2200" dirty="0" smtClean="0"/>
           </a:p>
           <a:p>
             <a:r>
               <a:rPr lang="fr-CH" sz="2400" dirty="0" smtClean="0"/>
-              <a:t>Aperçu de l’état </a:t>
-            </a:r>
-            <a:r>
-              <a:rPr lang="fr-CH" sz="2400" dirty="0" smtClean="0"/>
-              <a:t>d’avancement</a:t>
+              <a:t>Aperçu de l’état d’avancement</a:t>
             </a:r>
           </a:p>
           <a:p>
@@ -8274,7 +7614,6 @@
               <a:rPr lang="fr-CH" sz="2200" dirty="0" smtClean="0"/>
               <a:t>Implémentation</a:t>
             </a:r>
-            <a:endParaRPr lang="fr-CH" sz="2200" dirty="0" smtClean="0"/>
           </a:p>
           <a:p>
             <a:endParaRPr lang="fr-CH" sz="2400" dirty="0"/>
@@ -10148,11 +9487,7 @@
             <a:pPr lvl="1"/>
             <a:r>
               <a:rPr lang="fr-CH" dirty="0" smtClean="0"/>
-              <a:t>Nom | Adresse </a:t>
-            </a:r>
-            <a:r>
-              <a:rPr lang="fr-CH" dirty="0" smtClean="0"/>
-              <a:t>IP</a:t>
+              <a:t>Nom | Adresse IP</a:t>
             </a:r>
           </a:p>
           <a:p>
@@ -10176,11 +9511,7 @@
             <a:pPr lvl="2"/>
             <a:r>
               <a:rPr lang="fr-CH" dirty="0" smtClean="0"/>
-              <a:t>Accepter ou refuser </a:t>
-            </a:r>
-            <a:r>
-              <a:rPr lang="fr-CH" dirty="0" smtClean="0"/>
-              <a:t>l’invitation</a:t>
+              <a:t>Accepter ou refuser l’invitation</a:t>
             </a:r>
           </a:p>
           <a:p>
@@ -11499,25 +10830,81 @@
             </a:r>
             <a:r>
               <a:rPr lang="fr-CH" sz="1800" dirty="0" smtClean="0"/>
-              <a:t>en moins</a:t>
-            </a:r>
-          </a:p>
-          <a:p>
+              <a:t>en </a:t>
+            </a:r>
             <a:r>
               <a:rPr lang="fr-CH" sz="1800" dirty="0" smtClean="0"/>
-              <a:t>« Eventuelles autres tâches en retard ou avance » </a:t>
-            </a:r>
-            <a:r>
-              <a:rPr lang="fr-CH" sz="1800" b="1" u="sng" dirty="0" smtClean="0"/>
-              <a:t> </a:t>
-            </a:r>
-            <a:endParaRPr lang="fr-CH" sz="1800" b="1" u="sng" dirty="0"/>
+              <a:t>moins</a:t>
+            </a:r>
+            <a:endParaRPr lang="fr-CH" sz="1800" dirty="0" smtClean="0"/>
+          </a:p>
+        </p:txBody>
+      </p:sp>
+      <p:sp>
+        <p:nvSpPr>
+          <p:cNvPr id="15" name="ZoneTexte 14"/>
+          <p:cNvSpPr txBox="1"/>
+          <p:nvPr/>
+        </p:nvSpPr>
+        <p:spPr>
+          <a:xfrm>
+            <a:off x="6136146" y="1206600"/>
+            <a:ext cx="2907587" cy="276999"/>
+          </a:xfrm>
+          <a:prstGeom prst="rect">
+            <a:avLst/>
+          </a:prstGeom>
+          <a:noFill/>
+        </p:spPr>
+        <p:txBody>
+          <a:bodyPr wrap="square" rtlCol="0">
+            <a:spAutoFit/>
+          </a:bodyPr>
+          <a:lstStyle/>
+          <a:p>
+            <a:r>
+              <a:rPr lang="fr-CH" sz="1200" b="1" dirty="0" smtClean="0">
+                <a:solidFill>
+                  <a:srgbClr val="C00000"/>
+                </a:solidFill>
+              </a:rPr>
+              <a:t>État d’avancement</a:t>
+            </a:r>
+            <a:endParaRPr lang="fr-CH" sz="1200" b="1" dirty="0">
+              <a:solidFill>
+                <a:srgbClr val="C00000"/>
+              </a:solidFill>
+            </a:endParaRPr>
+          </a:p>
+        </p:txBody>
+      </p:sp>
+      <p:sp>
+        <p:nvSpPr>
+          <p:cNvPr id="16" name="Espace réservé du numéro de diapositive 15"/>
+          <p:cNvSpPr>
+            <a:spLocks noGrp="1"/>
+          </p:cNvSpPr>
+          <p:nvPr>
+            <p:ph type="sldNum" sz="quarter" idx="12"/>
+          </p:nvPr>
+        </p:nvSpPr>
+        <p:spPr/>
+        <p:txBody>
+          <a:bodyPr/>
+          <a:lstStyle/>
+          <a:p>
+            <a:fld id="{D57F1E4F-1CFF-5643-939E-217C01CDF565}" type="slidenum">
+              <a:rPr lang="en-US" smtClean="0"/>
+              <a:pPr/>
+              <a:t>7</a:t>
+            </a:fld>
+            <a:endParaRPr lang="en-US" dirty="0"/>
           </a:p>
         </p:txBody>
       </p:sp>
       <p:pic>
         <p:nvPicPr>
-          <p:cNvPr id="13" name="Image 12"/>
+          <p:cNvPr id="3" name="Image 2"/>
           <p:cNvPicPr>
             <a:picLocks noChangeAspect="1"/>
           </p:cNvPicPr>
@@ -11531,8 +10918,8 @@
         </p:blipFill>
         <p:spPr>
           <a:xfrm>
-            <a:off x="0" y="1520659"/>
-            <a:ext cx="9218391" cy="3873274"/>
+            <a:off x="0" y="1539979"/>
+            <a:ext cx="9144000" cy="3802380"/>
           </a:xfrm>
           <a:prstGeom prst="rect">
             <a:avLst/>
@@ -11547,7 +10934,7 @@
         </p:nvCxnSpPr>
         <p:spPr>
           <a:xfrm flipH="1">
-            <a:off x="6174769" y="1277898"/>
+            <a:off x="6132965" y="1236094"/>
             <a:ext cx="5482" cy="4116035"/>
           </a:xfrm>
           <a:prstGeom prst="line">
@@ -11570,68 +10957,6 @@
           </a:fontRef>
         </p:style>
       </p:cxnSp>
-      <p:sp>
-        <p:nvSpPr>
-          <p:cNvPr id="15" name="ZoneTexte 14"/>
-          <p:cNvSpPr txBox="1"/>
-          <p:nvPr/>
-        </p:nvSpPr>
-        <p:spPr>
-          <a:xfrm>
-            <a:off x="6136146" y="1206600"/>
-            <a:ext cx="2907587" cy="276999"/>
-          </a:xfrm>
-          <a:prstGeom prst="rect">
-            <a:avLst/>
-          </a:prstGeom>
-          <a:noFill/>
-        </p:spPr>
-        <p:txBody>
-          <a:bodyPr wrap="square" rtlCol="0">
-            <a:spAutoFit/>
-          </a:bodyPr>
-          <a:lstStyle/>
-          <a:p>
-            <a:r>
-              <a:rPr lang="fr-CH" sz="1200" b="1" dirty="0" smtClean="0">
-                <a:solidFill>
-                  <a:srgbClr val="C00000"/>
-                </a:solidFill>
-              </a:rPr>
-              <a:t>État d’avancement</a:t>
-            </a:r>
-            <a:endParaRPr lang="fr-CH" sz="1200" b="1" dirty="0">
-              <a:solidFill>
-                <a:srgbClr val="C00000"/>
-              </a:solidFill>
-            </a:endParaRPr>
-          </a:p>
-        </p:txBody>
-      </p:sp>
-      <p:sp>
-        <p:nvSpPr>
-          <p:cNvPr id="16" name="Espace réservé du numéro de diapositive 15"/>
-          <p:cNvSpPr>
-            <a:spLocks noGrp="1"/>
-          </p:cNvSpPr>
-          <p:nvPr>
-            <p:ph type="sldNum" sz="quarter" idx="12"/>
-          </p:nvPr>
-        </p:nvSpPr>
-        <p:spPr/>
-        <p:txBody>
-          <a:bodyPr/>
-          <a:lstStyle/>
-          <a:p>
-            <a:fld id="{D57F1E4F-1CFF-5643-939E-217C01CDF565}" type="slidenum">
-              <a:rPr lang="en-US" smtClean="0"/>
-              <a:pPr/>
-              <a:t>7</a:t>
-            </a:fld>
-            <a:endParaRPr lang="en-US" dirty="0"/>
-          </a:p>
-        </p:txBody>
-      </p:sp>
     </p:spTree>
     <p:extLst>
       <p:ext uri="{BB962C8B-B14F-4D97-AF65-F5344CB8AC3E}">
@@ -11851,121 +11176,6 @@
                                           <p:spTgt spid="12">
                                             <p:txEl>
                                               <p:pRg st="1" end="1"/>
-                                            </p:txEl>
-                                          </p:spTgt>
-                                        </p:tgtEl>
-                                        <p:attrNameLst>
-                                          <p:attrName>ppt_y</p:attrName>
-                                        </p:attrNameLst>
-                                      </p:cBhvr>
-                                      <p:tavLst>
-                                        <p:tav tm="0">
-                                          <p:val>
-                                            <p:strVal val="#ppt_y+.1"/>
-                                          </p:val>
-                                        </p:tav>
-                                        <p:tav tm="100000">
-                                          <p:val>
-                                            <p:strVal val="#ppt_y"/>
-                                          </p:val>
-                                        </p:tav>
-                                      </p:tavLst>
-                                    </p:anim>
-                                  </p:childTnLst>
-                                </p:cTn>
-                              </p:par>
-                            </p:childTnLst>
-                          </p:cTn>
-                        </p:par>
-                      </p:childTnLst>
-                    </p:cTn>
-                  </p:par>
-                  <p:par>
-                    <p:cTn id="17" fill="hold">
-                      <p:stCondLst>
-                        <p:cond delay="indefinite"/>
-                      </p:stCondLst>
-                      <p:childTnLst>
-                        <p:par>
-                          <p:cTn id="18" fill="hold">
-                            <p:stCondLst>
-                              <p:cond delay="0"/>
-                            </p:stCondLst>
-                            <p:childTnLst>
-                              <p:par>
-                                <p:cTn id="19" presetID="42" presetClass="entr" presetSubtype="0" fill="hold" nodeType="clickEffect">
-                                  <p:stCondLst>
-                                    <p:cond delay="0"/>
-                                  </p:stCondLst>
-                                  <p:childTnLst>
-                                    <p:set>
-                                      <p:cBhvr>
-                                        <p:cTn id="20" dur="1" fill="hold">
-                                          <p:stCondLst>
-                                            <p:cond delay="0"/>
-                                          </p:stCondLst>
-                                        </p:cTn>
-                                        <p:tgtEl>
-                                          <p:spTgt spid="12">
-                                            <p:txEl>
-                                              <p:pRg st="2" end="2"/>
-                                            </p:txEl>
-                                          </p:spTgt>
-                                        </p:tgtEl>
-                                        <p:attrNameLst>
-                                          <p:attrName>style.visibility</p:attrName>
-                                        </p:attrNameLst>
-                                      </p:cBhvr>
-                                      <p:to>
-                                        <p:strVal val="visible"/>
-                                      </p:to>
-                                    </p:set>
-                                    <p:animEffect transition="in" filter="fade">
-                                      <p:cBhvr>
-                                        <p:cTn id="21" dur="1000"/>
-                                        <p:tgtEl>
-                                          <p:spTgt spid="12">
-                                            <p:txEl>
-                                              <p:pRg st="2" end="2"/>
-                                            </p:txEl>
-                                          </p:spTgt>
-                                        </p:tgtEl>
-                                      </p:cBhvr>
-                                    </p:animEffect>
-                                    <p:anim calcmode="lin" valueType="num">
-                                      <p:cBhvr>
-                                        <p:cTn id="22" dur="1000" fill="hold"/>
-                                        <p:tgtEl>
-                                          <p:spTgt spid="12">
-                                            <p:txEl>
-                                              <p:pRg st="2" end="2"/>
-                                            </p:txEl>
-                                          </p:spTgt>
-                                        </p:tgtEl>
-                                        <p:attrNameLst>
-                                          <p:attrName>ppt_x</p:attrName>
-                                        </p:attrNameLst>
-                                      </p:cBhvr>
-                                      <p:tavLst>
-                                        <p:tav tm="0">
-                                          <p:val>
-                                            <p:strVal val="#ppt_x"/>
-                                          </p:val>
-                                        </p:tav>
-                                        <p:tav tm="100000">
-                                          <p:val>
-                                            <p:strVal val="#ppt_x"/>
-                                          </p:val>
-                                        </p:tav>
-                                      </p:tavLst>
-                                    </p:anim>
-                                    <p:anim calcmode="lin" valueType="num">
-                                      <p:cBhvr>
-                                        <p:cTn id="23" dur="1000" fill="hold"/>
-                                        <p:tgtEl>
-                                          <p:spTgt spid="12">
-                                            <p:txEl>
-                                              <p:pRg st="2" end="2"/>
                                             </p:txEl>
                                           </p:spTgt>
                                         </p:tgtEl>

</xml_diff>